<commit_message>
add hall-proof.pptx, edit bipartite-matching.pptx
</commit_message>
<xml_diff>
--- a/spring12/slidesS12/bipartite-matching.pptx
+++ b/spring12/slidesS12/bipartite-matching.pptx
@@ -5,10 +5,10 @@
     <p:sldMasterId id="2147483662" r:id="rId1"/>
   </p:sldMasterIdLst>
   <p:notesMasterIdLst>
-    <p:notesMasterId r:id="rId17"/>
+    <p:notesMasterId r:id="rId15"/>
   </p:notesMasterIdLst>
   <p:handoutMasterIdLst>
-    <p:handoutMasterId r:id="rId18"/>
+    <p:handoutMasterId r:id="rId16"/>
   </p:handoutMasterIdLst>
   <p:sldIdLst>
     <p:sldId id="857" r:id="rId2"/>
@@ -21,16 +21,14 @@
     <p:sldId id="864" r:id="rId9"/>
     <p:sldId id="865" r:id="rId10"/>
     <p:sldId id="866" r:id="rId11"/>
-    <p:sldId id="867" r:id="rId12"/>
-    <p:sldId id="868" r:id="rId13"/>
-    <p:sldId id="869" r:id="rId14"/>
-    <p:sldId id="870" r:id="rId15"/>
-    <p:sldId id="871" r:id="rId16"/>
+    <p:sldId id="872" r:id="rId12"/>
+    <p:sldId id="867" r:id="rId13"/>
+    <p:sldId id="868" r:id="rId14"/>
   </p:sldIdLst>
   <p:sldSz cx="9144000" cy="6858000" type="screen4x3"/>
   <p:notesSz cx="9601200" cy="7315200"/>
   <p:custDataLst>
-    <p:tags r:id="rId20"/>
+    <p:tags r:id="rId18"/>
   </p:custDataLst>
   <p:defaultTextStyle>
     <a:defPPr>
@@ -1117,7 +1115,7 @@
       </p:grpSpPr>
       <p:sp>
         <p:nvSpPr>
-          <p:cNvPr id="92162" name="Rectangle 2"/>
+          <p:cNvPr id="91138" name="Rectangle 2"/>
           <p:cNvSpPr>
             <a:spLocks noGrp="1" noRot="1" noChangeAspect="1" noChangeArrowheads="1" noTextEdit="1"/>
           </p:cNvSpPr>
@@ -1134,7 +1132,7 @@
       </p:sp>
       <p:sp>
         <p:nvSpPr>
-          <p:cNvPr id="92163" name="Rectangle 3"/>
+          <p:cNvPr id="91139" name="Rectangle 3"/>
           <p:cNvSpPr>
             <a:spLocks noGrp="1" noChangeArrowheads="1"/>
           </p:cNvSpPr>
@@ -1193,7 +1191,7 @@
       </p:grpSpPr>
       <p:sp>
         <p:nvSpPr>
-          <p:cNvPr id="93186" name="Rectangle 2"/>
+          <p:cNvPr id="92162" name="Rectangle 2"/>
           <p:cNvSpPr>
             <a:spLocks noGrp="1" noRot="1" noChangeAspect="1" noChangeArrowheads="1" noTextEdit="1"/>
           </p:cNvSpPr>
@@ -1210,159 +1208,7 @@
       </p:sp>
       <p:sp>
         <p:nvSpPr>
-          <p:cNvPr id="93187" name="Rectangle 3"/>
-          <p:cNvSpPr>
-            <a:spLocks noGrp="1" noChangeArrowheads="1"/>
-          </p:cNvSpPr>
-          <p:nvPr>
-            <p:ph type="body" idx="1"/>
-          </p:nvPr>
-        </p:nvSpPr>
-        <p:spPr>
-          <a:xfrm>
-            <a:off x="1279327" y="3474963"/>
-            <a:ext cx="7042547" cy="3291114"/>
-          </a:xfrm>
-          <a:solidFill>
-            <a:srgbClr val="FFFFFF"/>
-          </a:solidFill>
-          <a:ln>
-            <a:solidFill>
-              <a:srgbClr val="000000"/>
-            </a:solidFill>
-          </a:ln>
-        </p:spPr>
-        <p:txBody>
-          <a:bodyPr/>
-          <a:lstStyle/>
-          <a:p>
-            <a:endParaRPr lang="en-US" smtClean="0">
-              <a:latin typeface="Times New Roman" pitchFamily="8" charset="0"/>
-            </a:endParaRPr>
-          </a:p>
-        </p:txBody>
-      </p:sp>
-    </p:spTree>
-  </p:cSld>
-  <p:clrMapOvr>
-    <a:masterClrMapping/>
-  </p:clrMapOvr>
-</p:notes>
-</file>
-
-<file path=ppt/notesSlides/notesSlide14.xml><?xml version="1.0" encoding="utf-8"?>
-<p:notes xmlns:a="http://schemas.openxmlformats.org/drawingml/2006/main" xmlns:r="http://schemas.openxmlformats.org/officeDocument/2006/relationships" xmlns:p="http://schemas.openxmlformats.org/presentationml/2006/main">
-  <p:cSld>
-    <p:spTree>
-      <p:nvGrpSpPr>
-        <p:cNvPr id="1" name=""/>
-        <p:cNvGrpSpPr/>
-        <p:nvPr/>
-      </p:nvGrpSpPr>
-      <p:grpSpPr>
-        <a:xfrm>
-          <a:off x="0" y="0"/>
-          <a:ext cx="0" cy="0"/>
-          <a:chOff x="0" y="0"/>
-          <a:chExt cx="0" cy="0"/>
-        </a:xfrm>
-      </p:grpSpPr>
-      <p:sp>
-        <p:nvSpPr>
-          <p:cNvPr id="102402" name="Rectangle 2"/>
-          <p:cNvSpPr>
-            <a:spLocks noGrp="1" noRot="1" noChangeAspect="1" noChangeArrowheads="1" noTextEdit="1"/>
-          </p:cNvSpPr>
-          <p:nvPr>
-            <p:ph type="sldImg"/>
-          </p:nvPr>
-        </p:nvSpPr>
-        <p:spPr>
-          <a:solidFill>
-            <a:srgbClr val="FFFFFF"/>
-          </a:solidFill>
-          <a:ln/>
-        </p:spPr>
-      </p:sp>
-      <p:sp>
-        <p:nvSpPr>
-          <p:cNvPr id="102403" name="Rectangle 3"/>
-          <p:cNvSpPr>
-            <a:spLocks noGrp="1" noChangeArrowheads="1"/>
-          </p:cNvSpPr>
-          <p:nvPr>
-            <p:ph type="body" idx="1"/>
-          </p:nvPr>
-        </p:nvSpPr>
-        <p:spPr>
-          <a:xfrm>
-            <a:off x="1279327" y="3474963"/>
-            <a:ext cx="7042547" cy="3291114"/>
-          </a:xfrm>
-          <a:solidFill>
-            <a:srgbClr val="FFFFFF"/>
-          </a:solidFill>
-          <a:ln>
-            <a:solidFill>
-              <a:srgbClr val="000000"/>
-            </a:solidFill>
-          </a:ln>
-        </p:spPr>
-        <p:txBody>
-          <a:bodyPr/>
-          <a:lstStyle/>
-          <a:p>
-            <a:endParaRPr lang="en-US" smtClean="0">
-              <a:latin typeface="Times New Roman" pitchFamily="8" charset="0"/>
-            </a:endParaRPr>
-          </a:p>
-        </p:txBody>
-      </p:sp>
-    </p:spTree>
-  </p:cSld>
-  <p:clrMapOvr>
-    <a:masterClrMapping/>
-  </p:clrMapOvr>
-</p:notes>
-</file>
-
-<file path=ppt/notesSlides/notesSlide15.xml><?xml version="1.0" encoding="utf-8"?>
-<p:notes xmlns:a="http://schemas.openxmlformats.org/drawingml/2006/main" xmlns:r="http://schemas.openxmlformats.org/officeDocument/2006/relationships" xmlns:p="http://schemas.openxmlformats.org/presentationml/2006/main">
-  <p:cSld>
-    <p:spTree>
-      <p:nvGrpSpPr>
-        <p:cNvPr id="1" name=""/>
-        <p:cNvGrpSpPr/>
-        <p:nvPr/>
-      </p:nvGrpSpPr>
-      <p:grpSpPr>
-        <a:xfrm>
-          <a:off x="0" y="0"/>
-          <a:ext cx="0" cy="0"/>
-          <a:chOff x="0" y="0"/>
-          <a:chExt cx="0" cy="0"/>
-        </a:xfrm>
-      </p:grpSpPr>
-      <p:sp>
-        <p:nvSpPr>
-          <p:cNvPr id="102402" name="Rectangle 2"/>
-          <p:cNvSpPr>
-            <a:spLocks noGrp="1" noRot="1" noChangeAspect="1" noChangeArrowheads="1" noTextEdit="1"/>
-          </p:cNvSpPr>
-          <p:nvPr>
-            <p:ph type="sldImg"/>
-          </p:nvPr>
-        </p:nvSpPr>
-        <p:spPr>
-          <a:solidFill>
-            <a:srgbClr val="FFFFFF"/>
-          </a:solidFill>
-          <a:ln/>
-        </p:spPr>
-      </p:sp>
-      <p:sp>
-        <p:nvSpPr>
-          <p:cNvPr id="102403" name="Rectangle 3"/>
+          <p:cNvPr id="92163" name="Rectangle 3"/>
           <p:cNvSpPr>
             <a:spLocks noGrp="1" noChangeArrowheads="1"/>
           </p:cNvSpPr>
@@ -3810,9 +3656,14 @@
   <p:clrMapOvr>
     <a:masterClrMapping/>
   </p:clrMapOvr>
-  <p:transition xmlns:p14="http://schemas.microsoft.com/office/powerpoint/2010/main" spd="slow">
-    <p:fade thruBlk="1"/>
-  </p:transition>
+  <mc:AlternateContent xmlns:mc="http://schemas.openxmlformats.org/markup-compatibility/2006" xmlns:p14="http://schemas.microsoft.com/office/powerpoint/2010/main">
+    <mc:Choice Requires="p14">
+      <p:transition p14:dur="0"/>
+    </mc:Choice>
+    <mc:Fallback xmlns="">
+      <p:transition xmlns:p14="http://schemas.microsoft.com/office/powerpoint/2010/main"/>
+    </mc:Fallback>
+  </mc:AlternateContent>
   <p:timing>
     <p:tnLst>
       <p:par>
@@ -4892,7 +4743,7 @@
         <p:spPr bwMode="auto">
           <a:xfrm>
             <a:off x="7564467" y="3304223"/>
-            <a:ext cx="1439818" cy="769441"/>
+            <a:ext cx="1341558" cy="769441"/>
           </a:xfrm>
           <a:prstGeom prst="rect">
             <a:avLst/>
@@ -4918,7 +4769,7 @@
               <a:rPr lang="en-US" sz="4400" dirty="0" smtClean="0">
                 <a:latin typeface="Comic Sans MS" pitchFamily="8" charset="0"/>
               </a:rPr>
-              <a:t>N(</a:t>
+              <a:t>E(</a:t>
             </a:r>
             <a:r>
               <a:rPr lang="en-US" sz="4400" dirty="0" smtClean="0">
@@ -4955,7 +4806,7 @@
         <p:spPr bwMode="auto">
           <a:xfrm>
             <a:off x="2183795" y="5425482"/>
-            <a:ext cx="4623606" cy="1015663"/>
+            <a:ext cx="4740415" cy="1015663"/>
           </a:xfrm>
           <a:prstGeom prst="rect">
             <a:avLst/>
@@ -5000,8 +4851,11 @@
             </a:r>
             <a:r>
               <a:rPr lang="en-US" sz="6000" b="1" dirty="0" smtClean="0">
-                <a:latin typeface="Times New Roman" pitchFamily="18" charset="0"/>
-                <a:cs typeface="Times New Roman" pitchFamily="18" charset="0"/>
+                <a:solidFill>
+                  <a:srgbClr val="FF0000"/>
+                </a:solidFill>
+                <a:latin typeface="Euclid Symbol" charset="2"/>
+                <a:cs typeface="Euclid Symbol" charset="2"/>
               </a:rPr>
               <a:t>&gt;</a:t>
             </a:r>
@@ -5009,7 +4863,7 @@
               <a:rPr lang="en-US" sz="6000" dirty="0" smtClean="0">
                 <a:latin typeface="Comic Sans MS" pitchFamily="8" charset="0"/>
               </a:rPr>
-              <a:t> |N(</a:t>
+              <a:t> |E(</a:t>
             </a:r>
             <a:r>
               <a:rPr lang="en-US" sz="6000" dirty="0" smtClean="0">
@@ -5031,59 +4885,6 @@
                 <a:srgbClr val="FF0000"/>
               </a:solidFill>
               <a:latin typeface="Comic Sans MS" pitchFamily="8" charset="0"/>
-            </a:endParaRPr>
-          </a:p>
-        </p:txBody>
-      </p:sp>
-      <p:sp>
-        <p:nvSpPr>
-          <p:cNvPr id="34" name="Rectangle 33"/>
-          <p:cNvSpPr/>
-          <p:nvPr/>
-        </p:nvSpPr>
-        <p:spPr bwMode="auto">
-          <a:xfrm>
-            <a:off x="2107770" y="5362414"/>
-            <a:ext cx="4736914" cy="1162372"/>
-          </a:xfrm>
-          <a:prstGeom prst="rect">
-            <a:avLst/>
-          </a:prstGeom>
-          <a:noFill/>
-          <a:ln w="31750" cap="flat" cmpd="sng" algn="ctr">
-            <a:solidFill>
-              <a:srgbClr val="FF00FF"/>
-            </a:solidFill>
-            <a:prstDash val="solid"/>
-            <a:round/>
-            <a:headEnd type="none" w="med" len="med"/>
-            <a:tailEnd type="stealth" w="lg" len="lg"/>
-          </a:ln>
-          <a:effectLst/>
-        </p:spPr>
-        <p:txBody>
-          <a:bodyPr vert="horz" wrap="square" lIns="91440" tIns="45720" rIns="91440" bIns="45720" numCol="1" rtlCol="0" anchor="t" anchorCtr="0" compatLnSpc="1">
-            <a:prstTxWarp prst="textNoShape">
-              <a:avLst/>
-            </a:prstTxWarp>
-          </a:bodyPr>
-          <a:lstStyle/>
-          <a:p>
-            <a:pPr>
-              <a:spcBef>
-                <a:spcPct val="0"/>
-              </a:spcBef>
-              <a:buNone/>
-            </a:pPr>
-            <a:endParaRPr kumimoji="0" lang="en-US" sz="4000" b="0" i="0" u="none" strike="noStrike" cap="none" normalizeH="0" baseline="0" smtClean="0">
-              <a:ln>
-                <a:noFill/>
-              </a:ln>
-              <a:solidFill>
-                <a:schemeClr val="tx1"/>
-              </a:solidFill>
-              <a:effectLst/>
-              <a:latin typeface="Arial" pitchFamily="34" charset="0"/>
             </a:endParaRPr>
           </a:p>
         </p:txBody>
@@ -5098,9 +4899,18 @@
   <p:clrMapOvr>
     <a:masterClrMapping/>
   </p:clrMapOvr>
-  <p:transition xmlns:p14="http://schemas.microsoft.com/office/powerpoint/2010/main" spd="med">
-    <p:fade/>
-  </p:transition>
+  <mc:AlternateContent xmlns:mc="http://schemas.openxmlformats.org/markup-compatibility/2006" xmlns:p14="http://schemas.microsoft.com/office/powerpoint/2010/main">
+    <mc:Choice Requires="p14">
+      <p:transition spd="slow" p14:dur="900">
+        <p:fade thruBlk="1"/>
+      </p:transition>
+    </mc:Choice>
+    <mc:Fallback xmlns="">
+      <p:transition xmlns:p14="http://schemas.microsoft.com/office/powerpoint/2010/main" spd="slow">
+        <p:fade thruBlk="1"/>
+      </p:transition>
+    </mc:Fallback>
+  </mc:AlternateContent>
   <p:timing>
     <p:tnLst>
       <p:par>
@@ -5122,7 +4932,7 @@
                             </p:stCondLst>
                             <p:childTnLst>
                               <p:par>
-                                <p:cTn id="5" presetID="15" presetClass="entr" presetSubtype="0" fill="hold" grpId="0" nodeType="clickEffect">
+                                <p:cTn id="5" presetID="9" presetClass="entr" presetSubtype="0" fill="hold" grpId="0" nodeType="clickEffect">
                                   <p:stCondLst>
                                     <p:cond delay="0"/>
                                   </p:stCondLst>
@@ -5130,143 +4940,6 @@
                                     <p:set>
                                       <p:cBhvr>
                                         <p:cTn id="6" dur="1" fill="hold">
-                                          <p:stCondLst>
-                                            <p:cond delay="0"/>
-                                          </p:stCondLst>
-                                        </p:cTn>
-                                        <p:tgtEl>
-                                          <p:spTgt spid="34"/>
-                                        </p:tgtEl>
-                                        <p:attrNameLst>
-                                          <p:attrName>style.visibility</p:attrName>
-                                        </p:attrNameLst>
-                                      </p:cBhvr>
-                                      <p:to>
-                                        <p:strVal val="visible"/>
-                                      </p:to>
-                                    </p:set>
-                                    <p:anim calcmode="lin" valueType="num">
-                                      <p:cBhvr>
-                                        <p:cTn id="7" dur="1000" fill="hold"/>
-                                        <p:tgtEl>
-                                          <p:spTgt spid="34"/>
-                                        </p:tgtEl>
-                                        <p:attrNameLst>
-                                          <p:attrName>ppt_w</p:attrName>
-                                        </p:attrNameLst>
-                                      </p:cBhvr>
-                                      <p:tavLst>
-                                        <p:tav tm="0">
-                                          <p:val>
-                                            <p:fltVal val="0"/>
-                                          </p:val>
-                                        </p:tav>
-                                        <p:tav tm="100000">
-                                          <p:val>
-                                            <p:strVal val="#ppt_w"/>
-                                          </p:val>
-                                        </p:tav>
-                                      </p:tavLst>
-                                    </p:anim>
-                                    <p:anim calcmode="lin" valueType="num">
-                                      <p:cBhvr>
-                                        <p:cTn id="8" dur="1000" fill="hold"/>
-                                        <p:tgtEl>
-                                          <p:spTgt spid="34"/>
-                                        </p:tgtEl>
-                                        <p:attrNameLst>
-                                          <p:attrName>ppt_h</p:attrName>
-                                        </p:attrNameLst>
-                                      </p:cBhvr>
-                                      <p:tavLst>
-                                        <p:tav tm="0">
-                                          <p:val>
-                                            <p:fltVal val="0"/>
-                                          </p:val>
-                                        </p:tav>
-                                        <p:tav tm="100000">
-                                          <p:val>
-                                            <p:strVal val="#ppt_h"/>
-                                          </p:val>
-                                        </p:tav>
-                                      </p:tavLst>
-                                    </p:anim>
-                                    <p:anim calcmode="lin" valueType="num">
-                                      <p:cBhvr>
-                                        <p:cTn id="9" dur="1000" fill="hold"/>
-                                        <p:tgtEl>
-                                          <p:spTgt spid="34"/>
-                                        </p:tgtEl>
-                                        <p:attrNameLst>
-                                          <p:attrName>ppt_x</p:attrName>
-                                        </p:attrNameLst>
-                                      </p:cBhvr>
-                                      <p:tavLst>
-                                        <p:tav tm="0" fmla="#ppt_x+(cos(-2*pi*(1-$))*-#ppt_x-sin(-2*pi*(1-$))*(1-#ppt_y))*(1-$)">
-                                          <p:val>
-                                            <p:fltVal val="0"/>
-                                          </p:val>
-                                        </p:tav>
-                                        <p:tav tm="100000">
-                                          <p:val>
-                                            <p:fltVal val="1"/>
-                                          </p:val>
-                                        </p:tav>
-                                      </p:tavLst>
-                                    </p:anim>
-                                    <p:anim calcmode="lin" valueType="num">
-                                      <p:cBhvr>
-                                        <p:cTn id="10" dur="1000" fill="hold"/>
-                                        <p:tgtEl>
-                                          <p:spTgt spid="34"/>
-                                        </p:tgtEl>
-                                        <p:attrNameLst>
-                                          <p:attrName>ppt_y</p:attrName>
-                                        </p:attrNameLst>
-                                      </p:cBhvr>
-                                      <p:tavLst>
-                                        <p:tav tm="0" fmla="#ppt_y+(sin(-2*pi*(1-$))*-#ppt_x+cos(-2*pi*(1-$))*(1-#ppt_y))*(1-$)">
-                                          <p:val>
-                                            <p:fltVal val="0"/>
-                                          </p:val>
-                                        </p:tav>
-                                        <p:tav tm="100000">
-                                          <p:val>
-                                            <p:fltVal val="1"/>
-                                          </p:val>
-                                        </p:tav>
-                                      </p:tavLst>
-                                    </p:anim>
-                                  </p:childTnLst>
-                                </p:cTn>
-                              </p:par>
-                            </p:childTnLst>
-                          </p:cTn>
-                        </p:par>
-                      </p:childTnLst>
-                    </p:cTn>
-                  </p:par>
-                  <p:par>
-                    <p:cTn id="11" fill="hold">
-                      <p:stCondLst>
-                        <p:cond delay="indefinite"/>
-                      </p:stCondLst>
-                      <p:childTnLst>
-                        <p:par>
-                          <p:cTn id="12" fill="hold">
-                            <p:stCondLst>
-                              <p:cond delay="0"/>
-                            </p:stCondLst>
-                            <p:childTnLst>
-                              <p:par>
-                                <p:cTn id="13" presetID="9" presetClass="entr" presetSubtype="0" fill="hold" grpId="0" nodeType="clickEffect">
-                                  <p:stCondLst>
-                                    <p:cond delay="0"/>
-                                  </p:stCondLst>
-                                  <p:childTnLst>
-                                    <p:set>
-                                      <p:cBhvr>
-                                        <p:cTn id="14" dur="1" fill="hold">
                                           <p:stCondLst>
                                             <p:cond delay="0"/>
                                           </p:stCondLst>
@@ -5284,7 +4957,7 @@
                                     </p:set>
                                     <p:animEffect transition="in" filter="dissolve">
                                       <p:cBhvr>
-                                        <p:cTn id="15" dur="500"/>
+                                        <p:cTn id="7" dur="500"/>
                                         <p:tgtEl>
                                           <p:spTgt spid="36"/>
                                         </p:tgtEl>
@@ -5322,7 +4995,6 @@
     </p:tnLst>
     <p:bldLst>
       <p:bldP spid="36" grpId="0" animBg="1"/>
-      <p:bldP spid="34" grpId="0" animBg="1"/>
     </p:bldLst>
   </p:timing>
 </p:sld>
@@ -5361,9 +5033,9 @@
           <a:lstStyle/>
           <a:p>
             <a:r>
-              <a:rPr lang="en-US" sz="4000" dirty="0" smtClean="0">
+              <a:rPr lang="en-US" sz="3600" smtClean="0">
                 <a:solidFill>
-                  <a:schemeClr val="tx1"/>
+                  <a:srgbClr val="0000CC"/>
                 </a:solidFill>
               </a:rPr>
               <a:t>Bottleneck Lemma</a:t>
@@ -5373,97 +5045,214 @@
       </p:sp>
       <p:sp>
         <p:nvSpPr>
-          <p:cNvPr id="267267" name="Rectangle 3"/>
-          <p:cNvSpPr>
-            <a:spLocks noGrp="1" noChangeArrowheads="1"/>
-          </p:cNvSpPr>
-          <p:nvPr>
-            <p:ph type="body" idx="1"/>
-          </p:nvPr>
-        </p:nvSpPr>
-        <p:spPr>
-          <a:xfrm>
-            <a:off x="279700" y="2033197"/>
-            <a:ext cx="8627638" cy="2700156"/>
-          </a:xfrm>
+          <p:cNvPr id="267268" name="Text Box 4"/>
+          <p:cNvSpPr txBox="1">
+            <a:spLocks noChangeArrowheads="1"/>
+          </p:cNvSpPr>
+          <p:nvPr/>
+        </p:nvSpPr>
+        <p:spPr bwMode="auto">
+          <a:xfrm>
+            <a:off x="492492" y="984180"/>
+            <a:ext cx="8081660" cy="4819781"/>
+          </a:xfrm>
+          <a:prstGeom prst="rect">
+            <a:avLst/>
+          </a:prstGeom>
+          <a:noFill/>
+          <a:ln w="31750">
+            <a:noFill/>
+            <a:miter lim="800000"/>
+            <a:headEnd/>
+            <a:tailEnd type="none" w="lg" len="lg"/>
+          </a:ln>
         </p:spPr>
         <p:txBody>
-          <a:bodyPr/>
+          <a:bodyPr wrap="none">
+            <a:spAutoFit/>
+          </a:bodyPr>
           <a:lstStyle/>
           <a:p>
-            <a:pPr marL="0">
-              <a:spcBef>
-                <a:spcPct val="0"/>
-              </a:spcBef>
-              <a:buFontTx/>
+            <a:pPr>
               <a:buNone/>
             </a:pPr>
             <a:r>
-              <a:rPr lang="en-US" sz="5400" dirty="0" smtClean="0"/>
-              <a:t>If there </a:t>
-            </a:r>
-            <a:r>
-              <a:rPr lang="en-US" sz="5400" dirty="0" smtClean="0">
+              <a:rPr lang="en-US" sz="4800" dirty="0">
+                <a:solidFill>
+                  <a:srgbClr val="9F009F"/>
+                </a:solidFill>
+                <a:latin typeface="Comic Sans MS" pitchFamily="8" charset="0"/>
+              </a:rPr>
+              <a:t>Bottleneck:</a:t>
+            </a:r>
+            <a:r>
+              <a:rPr lang="en-US" sz="4800" i="1" dirty="0">
+                <a:latin typeface="Comic Sans MS" pitchFamily="8" charset="0"/>
+              </a:rPr>
+              <a:t> </a:t>
+            </a:r>
+            <a:r>
+              <a:rPr lang="en-US" sz="4800" dirty="0">
+                <a:latin typeface="Comic Sans MS" pitchFamily="8" charset="0"/>
+              </a:rPr>
+              <a:t>a set </a:t>
+            </a:r>
+            <a:r>
+              <a:rPr lang="en-US" sz="4800" dirty="0">
+                <a:solidFill>
+                  <a:srgbClr val="0033CC"/>
+                </a:solidFill>
+                <a:latin typeface="Comic Sans MS" pitchFamily="8" charset="0"/>
+              </a:rPr>
+              <a:t>S </a:t>
+            </a:r>
+            <a:r>
+              <a:rPr lang="en-US" sz="4800" dirty="0">
+                <a:latin typeface="Comic Sans MS" pitchFamily="8" charset="0"/>
+              </a:rPr>
+              <a:t>of </a:t>
+            </a:r>
+            <a:r>
+              <a:rPr lang="en-US" sz="4800" dirty="0" smtClean="0">
+                <a:latin typeface="Comic Sans MS" pitchFamily="8" charset="0"/>
+              </a:rPr>
+              <a:t>girls</a:t>
+            </a:r>
+          </a:p>
+          <a:p>
+            <a:pPr>
+              <a:buNone/>
+            </a:pPr>
+            <a:r>
+              <a:rPr lang="en-US" sz="4800" dirty="0" smtClean="0">
+                <a:latin typeface="Comic Sans MS" pitchFamily="8" charset="0"/>
+              </a:rPr>
+              <a:t>without </a:t>
+            </a:r>
+            <a:r>
+              <a:rPr lang="en-US" sz="4800" dirty="0">
+                <a:latin typeface="Comic Sans MS" pitchFamily="8" charset="0"/>
+              </a:rPr>
+              <a:t>enough boys.</a:t>
+            </a:r>
+          </a:p>
+          <a:p>
+            <a:pPr>
+              <a:buNone/>
+            </a:pPr>
+            <a:r>
+              <a:rPr lang="en-US" sz="4800" dirty="0" smtClean="0">
+                <a:latin typeface="Comic Sans MS" pitchFamily="8" charset="0"/>
+              </a:rPr>
+              <a:t>E(</a:t>
+            </a:r>
+            <a:r>
+              <a:rPr lang="en-US" sz="4800" dirty="0">
+                <a:solidFill>
+                  <a:srgbClr val="0033CC"/>
+                </a:solidFill>
+                <a:latin typeface="Comic Sans MS" pitchFamily="8" charset="0"/>
+              </a:rPr>
+              <a:t>S</a:t>
+            </a:r>
+            <a:r>
+              <a:rPr lang="en-US" sz="4800" dirty="0">
+                <a:latin typeface="Comic Sans MS" pitchFamily="8" charset="0"/>
+              </a:rPr>
+              <a:t>) ::= boys adjacent to at</a:t>
+            </a:r>
+          </a:p>
+          <a:p>
+            <a:pPr algn="ctr">
+              <a:buNone/>
+            </a:pPr>
+            <a:r>
+              <a:rPr lang="en-US" sz="4800" dirty="0">
+                <a:latin typeface="Comic Sans MS" pitchFamily="8" charset="0"/>
+              </a:rPr>
+              <a:t>             least one girl in </a:t>
+            </a:r>
+            <a:r>
+              <a:rPr lang="en-US" sz="4800" dirty="0">
+                <a:solidFill>
+                  <a:srgbClr val="0033CC"/>
+                </a:solidFill>
+                <a:latin typeface="Comic Sans MS" pitchFamily="8" charset="0"/>
+              </a:rPr>
+              <a:t>S</a:t>
+            </a:r>
+            <a:r>
+              <a:rPr lang="en-US" sz="4800" dirty="0">
+                <a:latin typeface="Comic Sans MS" pitchFamily="8" charset="0"/>
+              </a:rPr>
+              <a:t>.</a:t>
+            </a:r>
+          </a:p>
+          <a:p>
+            <a:pPr algn="ctr">
+              <a:buNone/>
+            </a:pPr>
+            <a:r>
+              <a:rPr lang="en-US" sz="6000" dirty="0" smtClean="0">
+                <a:latin typeface="Comic Sans MS" pitchFamily="8" charset="0"/>
+              </a:rPr>
+              <a:t>      </a:t>
+            </a:r>
+            <a:r>
+              <a:rPr lang="en-US" sz="7200" dirty="0" smtClean="0">
+                <a:latin typeface="Comic Sans MS" pitchFamily="8" charset="0"/>
+              </a:rPr>
+              <a:t> |</a:t>
+            </a:r>
+            <a:r>
+              <a:rPr lang="en-US" sz="7200" dirty="0">
+                <a:solidFill>
+                  <a:srgbClr val="0033CC"/>
+                </a:solidFill>
+                <a:latin typeface="Comic Sans MS" pitchFamily="8" charset="0"/>
+              </a:rPr>
+              <a:t>S</a:t>
+            </a:r>
+            <a:r>
+              <a:rPr lang="en-US" sz="7200" dirty="0" smtClean="0">
+                <a:latin typeface="Comic Sans MS" pitchFamily="8" charset="0"/>
+              </a:rPr>
+              <a:t>| </a:t>
+            </a:r>
+            <a:r>
+              <a:rPr lang="en-US" sz="7200" b="1" dirty="0" smtClean="0">
                 <a:solidFill>
                   <a:srgbClr val="FF0000"/>
                 </a:solidFill>
+                <a:latin typeface="Euclid Symbol" charset="2"/>
+                <a:cs typeface="Euclid Symbol" charset="2"/>
               </a:rPr>
-              <a:t>is </a:t>
-            </a:r>
-            <a:r>
-              <a:rPr lang="en-US" sz="5400" dirty="0" smtClean="0"/>
-              <a:t>a</a:t>
-            </a:r>
-            <a:r>
-              <a:rPr lang="en-US" sz="5400" dirty="0" smtClean="0">
+              <a:t>&gt;</a:t>
+            </a:r>
+            <a:r>
+              <a:rPr lang="en-US" sz="7200" dirty="0" smtClean="0">
+                <a:latin typeface="Comic Sans MS" pitchFamily="8" charset="0"/>
+              </a:rPr>
+              <a:t> |E(</a:t>
+            </a:r>
+            <a:r>
+              <a:rPr lang="en-US" sz="7200" dirty="0" smtClean="0">
                 <a:solidFill>
-                  <a:srgbClr val="FF0000"/>
+                  <a:srgbClr val="0033CC"/>
                 </a:solidFill>
+                <a:latin typeface="Comic Sans MS" pitchFamily="8" charset="0"/>
               </a:rPr>
-              <a:t> bottleneck</a:t>
-            </a:r>
-            <a:r>
-              <a:rPr lang="en-US" sz="5400" dirty="0" smtClean="0"/>
-              <a:t>,</a:t>
-            </a:r>
-          </a:p>
-          <a:p>
-            <a:pPr marL="0">
-              <a:spcBef>
-                <a:spcPct val="0"/>
-              </a:spcBef>
-              <a:buFontTx/>
-              <a:buNone/>
-            </a:pPr>
-            <a:r>
-              <a:rPr lang="en-US" sz="5400" dirty="0" smtClean="0"/>
-              <a:t>then </a:t>
-            </a:r>
-            <a:r>
-              <a:rPr lang="en-US" sz="5400" dirty="0" smtClean="0">
-                <a:solidFill>
-                  <a:srgbClr val="FF0000"/>
-                </a:solidFill>
+              <a:t>S</a:t>
+            </a:r>
+            <a:r>
+              <a:rPr lang="en-US" sz="7200" dirty="0" smtClean="0">
+                <a:latin typeface="Comic Sans MS" pitchFamily="8" charset="0"/>
               </a:rPr>
-              <a:t>no match</a:t>
-            </a:r>
-            <a:r>
-              <a:rPr lang="en-US" sz="5400" dirty="0" smtClean="0"/>
-              <a:t> is possible,</a:t>
-            </a:r>
-          </a:p>
-          <a:p>
-            <a:pPr marL="0" algn="ctr">
-              <a:spcBef>
-                <a:spcPct val="0"/>
-              </a:spcBef>
-              <a:buFontTx/>
-              <a:buNone/>
-            </a:pPr>
-            <a:r>
-              <a:rPr lang="en-US" sz="5400" dirty="0" smtClean="0"/>
-              <a:t>obviously.</a:t>
-            </a:r>
+              <a:t>)|</a:t>
+            </a:r>
+            <a:endParaRPr lang="en-US" sz="6000" dirty="0">
+              <a:latin typeface="Comic Sans MS" pitchFamily="8" charset="0"/>
+            </a:endParaRPr>
           </a:p>
         </p:txBody>
       </p:sp>
@@ -5495,7 +5284,7 @@
             </a:r>
             <a:r>
               <a:rPr lang="en-US" dirty="0" smtClean="0"/>
-              <a:t> 7F.</a:t>
+              <a:t> 7M.</a:t>
             </a:r>
             <a:fld id="{5FEE5B55-4292-4FA8-AE67-B2EB2C03FE54}" type="slidenum">
               <a:rPr lang="en-US" smtClean="0"/>
@@ -5503,6 +5292,401 @@
                 <a:defRPr/>
               </a:pPr>
               <a:t>11</a:t>
+            </a:fld>
+            <a:endParaRPr lang="en-US" dirty="0"/>
+          </a:p>
+        </p:txBody>
+      </p:sp>
+    </p:spTree>
+    <p:extLst>
+      <p:ext uri="{BB962C8B-B14F-4D97-AF65-F5344CB8AC3E}">
+        <p14:creationId xmlns:p14="http://schemas.microsoft.com/office/powerpoint/2010/main" val="2489375052"/>
+      </p:ext>
+    </p:extLst>
+  </p:cSld>
+  <p:clrMapOvr>
+    <a:masterClrMapping/>
+  </p:clrMapOvr>
+  <p:transition xmlns:p14="http://schemas.microsoft.com/office/powerpoint/2010/main">
+    <p:fade/>
+  </p:transition>
+  <p:timing>
+    <p:tnLst>
+      <p:par>
+        <p:cTn xmlns:p14="http://schemas.microsoft.com/office/powerpoint/2010/main" id="1" dur="indefinite" restart="never" nodeType="tmRoot">
+          <p:childTnLst>
+            <p:seq concurrent="1" nextAc="seek">
+              <p:cTn id="2" dur="indefinite" nodeType="mainSeq">
+                <p:childTnLst>
+                  <p:par>
+                    <p:cTn id="3" fill="hold">
+                      <p:stCondLst>
+                        <p:cond delay="indefinite"/>
+                      </p:stCondLst>
+                      <p:childTnLst>
+                        <p:par>
+                          <p:cTn id="4" fill="hold">
+                            <p:stCondLst>
+                              <p:cond delay="0"/>
+                            </p:stCondLst>
+                            <p:childTnLst>
+                              <p:par>
+                                <p:cTn id="5" presetID="9" presetClass="entr" presetSubtype="0" fill="hold" nodeType="clickEffect">
+                                  <p:stCondLst>
+                                    <p:cond delay="0"/>
+                                  </p:stCondLst>
+                                  <p:childTnLst>
+                                    <p:set>
+                                      <p:cBhvr>
+                                        <p:cTn id="6" dur="1" fill="hold">
+                                          <p:stCondLst>
+                                            <p:cond delay="0"/>
+                                          </p:stCondLst>
+                                        </p:cTn>
+                                        <p:tgtEl>
+                                          <p:spTgt spid="267268">
+                                            <p:txEl>
+                                              <p:pRg st="2" end="2"/>
+                                            </p:txEl>
+                                          </p:spTgt>
+                                        </p:tgtEl>
+                                        <p:attrNameLst>
+                                          <p:attrName>style.visibility</p:attrName>
+                                        </p:attrNameLst>
+                                      </p:cBhvr>
+                                      <p:to>
+                                        <p:strVal val="visible"/>
+                                      </p:to>
+                                    </p:set>
+                                    <p:animEffect transition="in" filter="dissolve">
+                                      <p:cBhvr>
+                                        <p:cTn id="7" dur="500"/>
+                                        <p:tgtEl>
+                                          <p:spTgt spid="267268">
+                                            <p:txEl>
+                                              <p:pRg st="2" end="2"/>
+                                            </p:txEl>
+                                          </p:spTgt>
+                                        </p:tgtEl>
+                                      </p:cBhvr>
+                                    </p:animEffect>
+                                  </p:childTnLst>
+                                </p:cTn>
+                              </p:par>
+                              <p:par>
+                                <p:cTn id="8" presetID="9" presetClass="entr" presetSubtype="0" fill="hold" nodeType="withEffect">
+                                  <p:stCondLst>
+                                    <p:cond delay="0"/>
+                                  </p:stCondLst>
+                                  <p:childTnLst>
+                                    <p:set>
+                                      <p:cBhvr>
+                                        <p:cTn id="9" dur="1" fill="hold">
+                                          <p:stCondLst>
+                                            <p:cond delay="0"/>
+                                          </p:stCondLst>
+                                        </p:cTn>
+                                        <p:tgtEl>
+                                          <p:spTgt spid="267268">
+                                            <p:txEl>
+                                              <p:pRg st="3" end="3"/>
+                                            </p:txEl>
+                                          </p:spTgt>
+                                        </p:tgtEl>
+                                        <p:attrNameLst>
+                                          <p:attrName>style.visibility</p:attrName>
+                                        </p:attrNameLst>
+                                      </p:cBhvr>
+                                      <p:to>
+                                        <p:strVal val="visible"/>
+                                      </p:to>
+                                    </p:set>
+                                    <p:animEffect transition="in" filter="dissolve">
+                                      <p:cBhvr>
+                                        <p:cTn id="10" dur="500"/>
+                                        <p:tgtEl>
+                                          <p:spTgt spid="267268">
+                                            <p:txEl>
+                                              <p:pRg st="3" end="3"/>
+                                            </p:txEl>
+                                          </p:spTgt>
+                                        </p:tgtEl>
+                                      </p:cBhvr>
+                                    </p:animEffect>
+                                  </p:childTnLst>
+                                </p:cTn>
+                              </p:par>
+                            </p:childTnLst>
+                          </p:cTn>
+                        </p:par>
+                      </p:childTnLst>
+                    </p:cTn>
+                  </p:par>
+                  <p:par>
+                    <p:cTn id="11" fill="hold">
+                      <p:stCondLst>
+                        <p:cond delay="indefinite"/>
+                      </p:stCondLst>
+                      <p:childTnLst>
+                        <p:par>
+                          <p:cTn id="12" fill="hold">
+                            <p:stCondLst>
+                              <p:cond delay="0"/>
+                            </p:stCondLst>
+                            <p:childTnLst>
+                              <p:par>
+                                <p:cTn id="13" presetID="22" presetClass="entr" presetSubtype="8" fill="hold" nodeType="clickEffect">
+                                  <p:stCondLst>
+                                    <p:cond delay="0"/>
+                                  </p:stCondLst>
+                                  <p:childTnLst>
+                                    <p:set>
+                                      <p:cBhvr>
+                                        <p:cTn id="14" dur="1" fill="hold">
+                                          <p:stCondLst>
+                                            <p:cond delay="0"/>
+                                          </p:stCondLst>
+                                        </p:cTn>
+                                        <p:tgtEl>
+                                          <p:spTgt spid="267268">
+                                            <p:txEl>
+                                              <p:pRg st="4" end="4"/>
+                                            </p:txEl>
+                                          </p:spTgt>
+                                        </p:tgtEl>
+                                        <p:attrNameLst>
+                                          <p:attrName>style.visibility</p:attrName>
+                                        </p:attrNameLst>
+                                      </p:cBhvr>
+                                      <p:to>
+                                        <p:strVal val="visible"/>
+                                      </p:to>
+                                    </p:set>
+                                    <p:animEffect transition="in" filter="wipe(left)">
+                                      <p:cBhvr>
+                                        <p:cTn id="15" dur="500"/>
+                                        <p:tgtEl>
+                                          <p:spTgt spid="267268">
+                                            <p:txEl>
+                                              <p:pRg st="4" end="4"/>
+                                            </p:txEl>
+                                          </p:spTgt>
+                                        </p:tgtEl>
+                                      </p:cBhvr>
+                                    </p:animEffect>
+                                  </p:childTnLst>
+                                </p:cTn>
+                              </p:par>
+                            </p:childTnLst>
+                          </p:cTn>
+                        </p:par>
+                      </p:childTnLst>
+                    </p:cTn>
+                  </p:par>
+                </p:childTnLst>
+              </p:cTn>
+              <p:prevCondLst>
+                <p:cond evt="onPrev" delay="0">
+                  <p:tgtEl>
+                    <p:sldTgt/>
+                  </p:tgtEl>
+                </p:cond>
+              </p:prevCondLst>
+              <p:nextCondLst>
+                <p:cond evt="onNext" delay="0">
+                  <p:tgtEl>
+                    <p:sldTgt/>
+                  </p:tgtEl>
+                </p:cond>
+              </p:nextCondLst>
+            </p:seq>
+          </p:childTnLst>
+        </p:cTn>
+      </p:par>
+    </p:tnLst>
+  </p:timing>
+</p:sld>
+</file>
+
+<file path=ppt/slides/slide12.xml><?xml version="1.0" encoding="utf-8"?>
+<p:sld xmlns:a="http://schemas.openxmlformats.org/drawingml/2006/main" xmlns:r="http://schemas.openxmlformats.org/officeDocument/2006/relationships" xmlns:p="http://schemas.openxmlformats.org/presentationml/2006/main">
+  <p:cSld>
+    <p:spTree>
+      <p:nvGrpSpPr>
+        <p:cNvPr id="1" name=""/>
+        <p:cNvGrpSpPr/>
+        <p:nvPr/>
+      </p:nvGrpSpPr>
+      <p:grpSpPr>
+        <a:xfrm>
+          <a:off x="0" y="0"/>
+          <a:ext cx="0" cy="0"/>
+          <a:chOff x="0" y="0"/>
+          <a:chExt cx="0" cy="0"/>
+        </a:xfrm>
+      </p:grpSpPr>
+      <p:sp>
+        <p:nvSpPr>
+          <p:cNvPr id="50178" name="Rectangle 2"/>
+          <p:cNvSpPr>
+            <a:spLocks noGrp="1" noChangeArrowheads="1"/>
+          </p:cNvSpPr>
+          <p:nvPr>
+            <p:ph type="title"/>
+          </p:nvPr>
+        </p:nvSpPr>
+        <p:spPr/>
+        <p:txBody>
+          <a:bodyPr/>
+          <a:lstStyle/>
+          <a:p>
+            <a:r>
+              <a:rPr lang="en-US" sz="4000" dirty="0" smtClean="0">
+                <a:solidFill>
+                  <a:schemeClr val="tx1"/>
+                </a:solidFill>
+              </a:rPr>
+              <a:t>Bottleneck Lemma</a:t>
+            </a:r>
+          </a:p>
+        </p:txBody>
+      </p:sp>
+      <p:sp>
+        <p:nvSpPr>
+          <p:cNvPr id="267267" name="Rectangle 3"/>
+          <p:cNvSpPr>
+            <a:spLocks noGrp="1" noChangeArrowheads="1"/>
+          </p:cNvSpPr>
+          <p:nvPr>
+            <p:ph type="body" idx="1"/>
+          </p:nvPr>
+        </p:nvSpPr>
+        <p:spPr>
+          <a:xfrm>
+            <a:off x="279700" y="2033197"/>
+            <a:ext cx="8627638" cy="2700156"/>
+          </a:xfrm>
+        </p:spPr>
+        <p:txBody>
+          <a:bodyPr/>
+          <a:lstStyle/>
+          <a:p>
+            <a:pPr marL="0">
+              <a:spcBef>
+                <a:spcPct val="0"/>
+              </a:spcBef>
+              <a:buFontTx/>
+              <a:buNone/>
+            </a:pPr>
+            <a:r>
+              <a:rPr lang="en-US" sz="5400" dirty="0" smtClean="0"/>
+              <a:t>If there </a:t>
+            </a:r>
+            <a:r>
+              <a:rPr lang="en-US" sz="5400" dirty="0" smtClean="0">
+                <a:solidFill>
+                  <a:srgbClr val="FF0000"/>
+                </a:solidFill>
+              </a:rPr>
+              <a:t>is </a:t>
+            </a:r>
+            <a:r>
+              <a:rPr lang="en-US" sz="5400" dirty="0" smtClean="0"/>
+              <a:t>a</a:t>
+            </a:r>
+            <a:r>
+              <a:rPr lang="en-US" sz="5400" dirty="0" smtClean="0">
+                <a:solidFill>
+                  <a:srgbClr val="FF0000"/>
+                </a:solidFill>
+              </a:rPr>
+              <a:t> bottleneck</a:t>
+            </a:r>
+            <a:r>
+              <a:rPr lang="en-US" sz="5400" dirty="0" smtClean="0"/>
+              <a:t>,</a:t>
+            </a:r>
+          </a:p>
+          <a:p>
+            <a:pPr marL="0">
+              <a:spcBef>
+                <a:spcPct val="0"/>
+              </a:spcBef>
+              <a:buFontTx/>
+              <a:buNone/>
+            </a:pPr>
+            <a:r>
+              <a:rPr lang="en-US" sz="5400" dirty="0" smtClean="0"/>
+              <a:t>then </a:t>
+            </a:r>
+            <a:r>
+              <a:rPr lang="en-US" sz="5400" dirty="0" smtClean="0">
+                <a:solidFill>
+                  <a:srgbClr val="FF0000"/>
+                </a:solidFill>
+              </a:rPr>
+              <a:t>no match</a:t>
+            </a:r>
+            <a:r>
+              <a:rPr lang="en-US" sz="5400" dirty="0" smtClean="0"/>
+              <a:t> is possible</a:t>
+            </a:r>
+          </a:p>
+          <a:p>
+            <a:pPr marL="0" algn="ctr">
+              <a:spcBef>
+                <a:spcPct val="0"/>
+              </a:spcBef>
+              <a:buFontTx/>
+              <a:buNone/>
+            </a:pPr>
+            <a:r>
+              <a:rPr lang="en-US" sz="5400" dirty="0" smtClean="0">
+                <a:solidFill>
+                  <a:srgbClr val="9F009F"/>
+                </a:solidFill>
+              </a:rPr>
+              <a:t>obviously</a:t>
+            </a:r>
+          </a:p>
+        </p:txBody>
+      </p:sp>
+      <p:sp>
+        <p:nvSpPr>
+          <p:cNvPr id="5" name="Rectangle 11"/>
+          <p:cNvSpPr>
+            <a:spLocks noGrp="1" noChangeArrowheads="1"/>
+          </p:cNvSpPr>
+          <p:nvPr>
+            <p:ph type="sldNum" sz="quarter" idx="10"/>
+          </p:nvPr>
+        </p:nvSpPr>
+        <p:spPr/>
+        <p:txBody>
+          <a:bodyPr/>
+          <a:lstStyle>
+            <a:lvl1pPr>
+              <a:defRPr/>
+            </a:lvl1pPr>
+          </a:lstStyle>
+          <a:p>
+            <a:pPr>
+              <a:defRPr/>
+            </a:pPr>
+            <a:r>
+              <a:rPr lang="en-US" dirty="0" err="1" smtClean="0"/>
+              <a:t>lec</a:t>
+            </a:r>
+            <a:r>
+              <a:rPr lang="en-US" dirty="0" smtClean="0"/>
+              <a:t> 7F.</a:t>
+            </a:r>
+            <a:fld id="{5FEE5B55-4292-4FA8-AE67-B2EB2C03FE54}" type="slidenum">
+              <a:rPr lang="en-US" smtClean="0"/>
+              <a:pPr>
+                <a:defRPr/>
+              </a:pPr>
+              <a:t>12</a:t>
             </a:fld>
             <a:endParaRPr lang="en-US" dirty="0"/>
           </a:p>
@@ -5657,393 +5841,6 @@
 </p:sld>
 </file>
 
-<file path=ppt/slides/slide12.xml><?xml version="1.0" encoding="utf-8"?>
-<p:sld xmlns:a="http://schemas.openxmlformats.org/drawingml/2006/main" xmlns:r="http://schemas.openxmlformats.org/officeDocument/2006/relationships" xmlns:p="http://schemas.openxmlformats.org/presentationml/2006/main">
-  <p:cSld>
-    <p:spTree>
-      <p:nvGrpSpPr>
-        <p:cNvPr id="1" name=""/>
-        <p:cNvGrpSpPr/>
-        <p:nvPr/>
-      </p:nvGrpSpPr>
-      <p:grpSpPr>
-        <a:xfrm>
-          <a:off x="0" y="0"/>
-          <a:ext cx="0" cy="0"/>
-          <a:chOff x="0" y="0"/>
-          <a:chExt cx="0" cy="0"/>
-        </a:xfrm>
-      </p:grpSpPr>
-      <p:sp>
-        <p:nvSpPr>
-          <p:cNvPr id="51202" name="Rectangle 2"/>
-          <p:cNvSpPr>
-            <a:spLocks noGrp="1" noChangeArrowheads="1"/>
-          </p:cNvSpPr>
-          <p:nvPr>
-            <p:ph type="body" idx="1"/>
-          </p:nvPr>
-        </p:nvSpPr>
-        <p:spPr>
-          <a:xfrm>
-            <a:off x="457200" y="1974850"/>
-            <a:ext cx="8310563" cy="2838450"/>
-          </a:xfrm>
-        </p:spPr>
-        <p:txBody>
-          <a:bodyPr/>
-          <a:lstStyle/>
-          <a:p>
-            <a:pPr>
-              <a:lnSpc>
-                <a:spcPct val="90000"/>
-              </a:lnSpc>
-              <a:buFontTx/>
-              <a:buNone/>
-            </a:pPr>
-            <a:r>
-              <a:rPr lang="en-US" sz="5400" dirty="0" smtClean="0">
-                <a:solidFill>
-                  <a:schemeClr val="tx1">
-                    <a:lumMod val="95000"/>
-                    <a:lumOff val="5000"/>
-                  </a:schemeClr>
-                </a:solidFill>
-              </a:rPr>
-              <a:t>Conversely,</a:t>
-            </a:r>
-            <a:r>
-              <a:rPr lang="en-US" sz="5400" dirty="0" smtClean="0"/>
-              <a:t> if there are </a:t>
-            </a:r>
-          </a:p>
-          <a:p>
-            <a:pPr>
-              <a:lnSpc>
-                <a:spcPct val="90000"/>
-              </a:lnSpc>
-              <a:buFontTx/>
-              <a:buNone/>
-            </a:pPr>
-            <a:r>
-              <a:rPr lang="en-US" sz="5400" dirty="0" smtClean="0">
-                <a:solidFill>
-                  <a:srgbClr val="008000"/>
-                </a:solidFill>
-              </a:rPr>
-              <a:t>no bottlenecks</a:t>
-            </a:r>
-            <a:r>
-              <a:rPr lang="en-US" sz="5400" dirty="0" smtClean="0"/>
-              <a:t>, then</a:t>
-            </a:r>
-          </a:p>
-          <a:p>
-            <a:pPr>
-              <a:lnSpc>
-                <a:spcPct val="90000"/>
-              </a:lnSpc>
-              <a:buFontTx/>
-              <a:buNone/>
-            </a:pPr>
-            <a:r>
-              <a:rPr lang="en-US" sz="5400" dirty="0" smtClean="0"/>
-              <a:t>there is a</a:t>
-            </a:r>
-            <a:r>
-              <a:rPr lang="en-US" sz="5400" dirty="0" smtClean="0">
-                <a:solidFill>
-                  <a:srgbClr val="008000"/>
-                </a:solidFill>
-              </a:rPr>
-              <a:t> match</a:t>
-            </a:r>
-            <a:r>
-              <a:rPr lang="en-US" sz="5400" dirty="0" smtClean="0"/>
-              <a:t>.</a:t>
-            </a:r>
-          </a:p>
-        </p:txBody>
-      </p:sp>
-      <p:sp>
-        <p:nvSpPr>
-          <p:cNvPr id="51203" name="Rectangle 3"/>
-          <p:cNvSpPr>
-            <a:spLocks noGrp="1" noChangeArrowheads="1"/>
-          </p:cNvSpPr>
-          <p:nvPr>
-            <p:ph type="title"/>
-          </p:nvPr>
-        </p:nvSpPr>
-        <p:spPr>
-          <a:noFill/>
-        </p:spPr>
-        <p:txBody>
-          <a:bodyPr/>
-          <a:lstStyle/>
-          <a:p>
-            <a:r>
-              <a:rPr lang="en-US" sz="4800" dirty="0" smtClean="0"/>
-              <a:t>Hall’s Theorem</a:t>
-            </a:r>
-          </a:p>
-        </p:txBody>
-      </p:sp>
-      <p:sp>
-        <p:nvSpPr>
-          <p:cNvPr id="4" name="Rectangle 11"/>
-          <p:cNvSpPr>
-            <a:spLocks noGrp="1" noChangeArrowheads="1"/>
-          </p:cNvSpPr>
-          <p:nvPr>
-            <p:ph type="sldNum" sz="quarter" idx="10"/>
-          </p:nvPr>
-        </p:nvSpPr>
-        <p:spPr/>
-        <p:txBody>
-          <a:bodyPr/>
-          <a:lstStyle>
-            <a:lvl1pPr>
-              <a:defRPr/>
-            </a:lvl1pPr>
-          </a:lstStyle>
-          <a:p>
-            <a:pPr>
-              <a:defRPr/>
-            </a:pPr>
-            <a:r>
-              <a:rPr lang="en-US" dirty="0" err="1" smtClean="0"/>
-              <a:t>lec</a:t>
-            </a:r>
-            <a:r>
-              <a:rPr lang="en-US" dirty="0" smtClean="0"/>
-              <a:t> 7F.</a:t>
-            </a:r>
-            <a:fld id="{EE815EBE-A80C-4F04-9B8C-61CDAF6F5EB4}" type="slidenum">
-              <a:rPr lang="en-US" smtClean="0"/>
-              <a:pPr>
-                <a:defRPr/>
-              </a:pPr>
-              <a:t>12</a:t>
-            </a:fld>
-            <a:endParaRPr lang="en-US" dirty="0"/>
-          </a:p>
-        </p:txBody>
-      </p:sp>
-    </p:spTree>
-    <p:extLst>
-      <p:ext uri="{BB962C8B-B14F-4D97-AF65-F5344CB8AC3E}">
-        <p14:creationId xmlns:p14="http://schemas.microsoft.com/office/powerpoint/2010/main" val="3428000925"/>
-      </p:ext>
-    </p:extLst>
-  </p:cSld>
-  <p:clrMapOvr>
-    <a:masterClrMapping/>
-  </p:clrMapOvr>
-  <p:transition xmlns:p14="http://schemas.microsoft.com/office/powerpoint/2010/main">
-    <p:fade/>
-  </p:transition>
-  <p:timing>
-    <p:tnLst>
-      <p:par>
-        <p:cTn xmlns:p14="http://schemas.microsoft.com/office/powerpoint/2010/main" id="1" dur="indefinite" restart="never" nodeType="tmRoot">
-          <p:childTnLst>
-            <p:seq concurrent="1" nextAc="seek">
-              <p:cTn id="2" dur="indefinite" nodeType="mainSeq">
-                <p:childTnLst>
-                  <p:par>
-                    <p:cTn id="3" fill="hold">
-                      <p:stCondLst>
-                        <p:cond delay="indefinite"/>
-                      </p:stCondLst>
-                      <p:childTnLst>
-                        <p:par>
-                          <p:cTn id="4" fill="hold">
-                            <p:stCondLst>
-                              <p:cond delay="0"/>
-                            </p:stCondLst>
-                            <p:childTnLst>
-                              <p:par>
-                                <p:cTn id="5" presetID="22" presetClass="entr" presetSubtype="1" fill="hold" grpId="0" nodeType="clickEffect">
-                                  <p:stCondLst>
-                                    <p:cond delay="0"/>
-                                  </p:stCondLst>
-                                  <p:childTnLst>
-                                    <p:set>
-                                      <p:cBhvr>
-                                        <p:cTn id="6" dur="1" fill="hold">
-                                          <p:stCondLst>
-                                            <p:cond delay="0"/>
-                                          </p:stCondLst>
-                                        </p:cTn>
-                                        <p:tgtEl>
-                                          <p:spTgt spid="51202">
-                                            <p:txEl>
-                                              <p:pRg st="0" end="0"/>
-                                            </p:txEl>
-                                          </p:spTgt>
-                                        </p:tgtEl>
-                                        <p:attrNameLst>
-                                          <p:attrName>style.visibility</p:attrName>
-                                        </p:attrNameLst>
-                                      </p:cBhvr>
-                                      <p:to>
-                                        <p:strVal val="visible"/>
-                                      </p:to>
-                                    </p:set>
-                                    <p:animEffect transition="in" filter="wipe(up)">
-                                      <p:cBhvr>
-                                        <p:cTn id="7" dur="500"/>
-                                        <p:tgtEl>
-                                          <p:spTgt spid="51202">
-                                            <p:txEl>
-                                              <p:pRg st="0" end="0"/>
-                                            </p:txEl>
-                                          </p:spTgt>
-                                        </p:tgtEl>
-                                      </p:cBhvr>
-                                    </p:animEffect>
-                                  </p:childTnLst>
-                                </p:cTn>
-                              </p:par>
-                            </p:childTnLst>
-                          </p:cTn>
-                        </p:par>
-                        <p:par>
-                          <p:cTn id="8" fill="hold">
-                            <p:stCondLst>
-                              <p:cond delay="500"/>
-                            </p:stCondLst>
-                            <p:childTnLst>
-                              <p:par>
-                                <p:cTn id="9" presetID="22" presetClass="entr" presetSubtype="1" fill="hold" grpId="0" nodeType="afterEffect">
-                                  <p:stCondLst>
-                                    <p:cond delay="0"/>
-                                  </p:stCondLst>
-                                  <p:childTnLst>
-                                    <p:set>
-                                      <p:cBhvr>
-                                        <p:cTn id="10" dur="1" fill="hold">
-                                          <p:stCondLst>
-                                            <p:cond delay="0"/>
-                                          </p:stCondLst>
-                                        </p:cTn>
-                                        <p:tgtEl>
-                                          <p:spTgt spid="51202">
-                                            <p:txEl>
-                                              <p:pRg st="1" end="1"/>
-                                            </p:txEl>
-                                          </p:spTgt>
-                                        </p:tgtEl>
-                                        <p:attrNameLst>
-                                          <p:attrName>style.visibility</p:attrName>
-                                        </p:attrNameLst>
-                                      </p:cBhvr>
-                                      <p:to>
-                                        <p:strVal val="visible"/>
-                                      </p:to>
-                                    </p:set>
-                                    <p:animEffect transition="in" filter="wipe(up)">
-                                      <p:cBhvr>
-                                        <p:cTn id="11" dur="500"/>
-                                        <p:tgtEl>
-                                          <p:spTgt spid="51202">
-                                            <p:txEl>
-                                              <p:pRg st="1" end="1"/>
-                                            </p:txEl>
-                                          </p:spTgt>
-                                        </p:tgtEl>
-                                      </p:cBhvr>
-                                    </p:animEffect>
-                                  </p:childTnLst>
-                                </p:cTn>
-                              </p:par>
-                            </p:childTnLst>
-                          </p:cTn>
-                        </p:par>
-                        <p:par>
-                          <p:cTn id="12" fill="hold">
-                            <p:stCondLst>
-                              <p:cond delay="1000"/>
-                            </p:stCondLst>
-                            <p:childTnLst>
-                              <p:par>
-                                <p:cTn id="13" presetID="22" presetClass="entr" presetSubtype="1" fill="hold" grpId="0" nodeType="afterEffect">
-                                  <p:stCondLst>
-                                    <p:cond delay="0"/>
-                                  </p:stCondLst>
-                                  <p:childTnLst>
-                                    <p:set>
-                                      <p:cBhvr>
-                                        <p:cTn id="14" dur="1" fill="hold">
-                                          <p:stCondLst>
-                                            <p:cond delay="0"/>
-                                          </p:stCondLst>
-                                        </p:cTn>
-                                        <p:tgtEl>
-                                          <p:spTgt spid="51202">
-                                            <p:txEl>
-                                              <p:pRg st="2" end="2"/>
-                                            </p:txEl>
-                                          </p:spTgt>
-                                        </p:tgtEl>
-                                        <p:attrNameLst>
-                                          <p:attrName>style.visibility</p:attrName>
-                                        </p:attrNameLst>
-                                      </p:cBhvr>
-                                      <p:to>
-                                        <p:strVal val="visible"/>
-                                      </p:to>
-                                    </p:set>
-                                    <p:animEffect transition="in" filter="wipe(up)">
-                                      <p:cBhvr>
-                                        <p:cTn id="15" dur="500"/>
-                                        <p:tgtEl>
-                                          <p:spTgt spid="51202">
-                                            <p:txEl>
-                                              <p:pRg st="2" end="2"/>
-                                            </p:txEl>
-                                          </p:spTgt>
-                                        </p:tgtEl>
-                                      </p:cBhvr>
-                                    </p:animEffect>
-                                  </p:childTnLst>
-                                </p:cTn>
-                              </p:par>
-                            </p:childTnLst>
-                          </p:cTn>
-                        </p:par>
-                      </p:childTnLst>
-                    </p:cTn>
-                  </p:par>
-                </p:childTnLst>
-              </p:cTn>
-              <p:prevCondLst>
-                <p:cond evt="onPrev" delay="0">
-                  <p:tgtEl>
-                    <p:sldTgt/>
-                  </p:tgtEl>
-                </p:cond>
-              </p:prevCondLst>
-              <p:nextCondLst>
-                <p:cond evt="onNext" delay="0">
-                  <p:tgtEl>
-                    <p:sldTgt/>
-                  </p:tgtEl>
-                </p:cond>
-              </p:nextCondLst>
-            </p:seq>
-          </p:childTnLst>
-        </p:cTn>
-      </p:par>
-    </p:tnLst>
-    <p:bldLst>
-      <p:bldP spid="51202" grpId="0" build="p"/>
-    </p:bldLst>
-  </p:timing>
-</p:sld>
-</file>
-
 <file path=ppt/slides/slide13.xml><?xml version="1.0" encoding="utf-8"?>
 <p:sld xmlns:a="http://schemas.openxmlformats.org/drawingml/2006/main" xmlns:r="http://schemas.openxmlformats.org/officeDocument/2006/relationships" xmlns:p="http://schemas.openxmlformats.org/presentationml/2006/main">
   <p:cSld>
@@ -6063,111 +5860,62 @@
       </p:grpSpPr>
       <p:sp>
         <p:nvSpPr>
-          <p:cNvPr id="52226" name="Rectangle 2"/>
+          <p:cNvPr id="51202" name="Rectangle 2"/>
           <p:cNvSpPr>
             <a:spLocks noGrp="1" noChangeArrowheads="1"/>
           </p:cNvSpPr>
           <p:nvPr>
-            <p:ph type="body" idx="4294967295"/>
+            <p:ph type="body" idx="1"/>
           </p:nvPr>
         </p:nvSpPr>
         <p:spPr>
           <a:xfrm>
-            <a:off x="400824" y="1668359"/>
-            <a:ext cx="7797245" cy="3092816"/>
+            <a:off x="457200" y="1974850"/>
+            <a:ext cx="8310563" cy="2838450"/>
           </a:xfrm>
         </p:spPr>
         <p:txBody>
           <a:bodyPr/>
           <a:lstStyle/>
           <a:p>
-            <a:pPr marL="0" indent="0">
-              <a:spcBef>
-                <a:spcPct val="0"/>
-              </a:spcBef>
+            <a:pPr>
+              <a:lnSpc>
+                <a:spcPct val="90000"/>
+              </a:lnSpc>
+              <a:buFontTx/>
               <a:buNone/>
-              <a:defRPr/>
             </a:pPr>
-            <a:r>
-              <a:rPr lang="en-US" sz="5400" dirty="0" smtClean="0"/>
-              <a:t>If </a:t>
-            </a:r>
             <a:r>
               <a:rPr lang="en-US" sz="5400" dirty="0" smtClean="0">
                 <a:solidFill>
-                  <a:schemeClr val="accent1">
-                    <a:lumMod val="50000"/>
+                  <a:schemeClr val="tx1">
+                    <a:lumMod val="95000"/>
+                    <a:lumOff val="5000"/>
                   </a:schemeClr>
                 </a:solidFill>
               </a:rPr>
-              <a:t>|S|</a:t>
-            </a:r>
-            <a:r>
-              <a:rPr lang="en-US" sz="5400" b="1" dirty="0" smtClean="0">
-                <a:solidFill>
-                  <a:schemeClr val="accent1">
-                    <a:lumMod val="50000"/>
-                  </a:schemeClr>
-                </a:solidFill>
-                <a:latin typeface="Cambria Math" pitchFamily="18" charset="0"/>
-                <a:ea typeface="Cambria Math" pitchFamily="18" charset="0"/>
-              </a:rPr>
-              <a:t>≤</a:t>
-            </a:r>
+              <a:t>Conversely,</a:t>
+            </a:r>
+            <a:r>
+              <a:rPr lang="en-US" sz="5400" dirty="0" smtClean="0"/>
+              <a:t> if there are </a:t>
+            </a:r>
+          </a:p>
+          <a:p>
+            <a:pPr>
+              <a:lnSpc>
+                <a:spcPct val="90000"/>
+              </a:lnSpc>
+              <a:buFontTx/>
+              <a:buNone/>
+            </a:pPr>
             <a:r>
               <a:rPr lang="en-US" sz="5400" dirty="0" smtClean="0">
                 <a:solidFill>
-                  <a:schemeClr val="accent1">
-                    <a:lumMod val="50000"/>
-                  </a:schemeClr>
+                  <a:srgbClr val="008000"/>
                 </a:solidFill>
               </a:rPr>
-              <a:t>|N(S)| </a:t>
-            </a:r>
-            <a:r>
-              <a:rPr lang="en-US" sz="5400" dirty="0" smtClean="0"/>
-              <a:t>for</a:t>
-            </a:r>
-            <a:r>
-              <a:rPr lang="en-US" sz="5400" dirty="0" smtClean="0">
-                <a:solidFill>
-                  <a:schemeClr val="accent1">
-                    <a:lumMod val="50000"/>
-                  </a:schemeClr>
-                </a:solidFill>
-              </a:rPr>
-              <a:t> </a:t>
-            </a:r>
-            <a:r>
-              <a:rPr lang="en-US" sz="5400" dirty="0" smtClean="0">
-                <a:solidFill>
-                  <a:srgbClr val="660066"/>
-                </a:solidFill>
-              </a:rPr>
-              <a:t>all</a:t>
-            </a:r>
-          </a:p>
-          <a:p>
-            <a:pPr marL="0" indent="0">
-              <a:spcBef>
-                <a:spcPts val="2400"/>
-              </a:spcBef>
-              <a:buNone/>
-              <a:defRPr/>
-            </a:pPr>
-            <a:r>
-              <a:rPr lang="en-US" sz="5400" dirty="0" smtClean="0"/>
-              <a:t>sets of girls,</a:t>
-            </a:r>
-            <a:r>
-              <a:rPr lang="en-US" sz="5400" dirty="0" smtClean="0">
-                <a:solidFill>
-                  <a:schemeClr val="accent1">
-                    <a:lumMod val="50000"/>
-                  </a:schemeClr>
-                </a:solidFill>
-              </a:rPr>
-              <a:t> S</a:t>
+              <a:t>no bottlenecks</a:t>
             </a:r>
             <a:r>
               <a:rPr lang="en-US" sz="5400" dirty="0" smtClean="0"/>
@@ -6175,12 +5923,12 @@
             </a:r>
           </a:p>
           <a:p>
-            <a:pPr marL="0" indent="0">
-              <a:spcBef>
-                <a:spcPct val="0"/>
-              </a:spcBef>
+            <a:pPr>
+              <a:lnSpc>
+                <a:spcPct val="90000"/>
+              </a:lnSpc>
+              <a:buFontTx/>
               <a:buNone/>
-              <a:defRPr/>
             </a:pPr>
             <a:r>
               <a:rPr lang="en-US" sz="5400" dirty="0" smtClean="0"/>
@@ -6203,19 +5951,15 @@
       </p:sp>
       <p:sp>
         <p:nvSpPr>
-          <p:cNvPr id="52227" name="Rectangle 3"/>
+          <p:cNvPr id="51203" name="Rectangle 3"/>
           <p:cNvSpPr>
             <a:spLocks noGrp="1" noChangeArrowheads="1"/>
           </p:cNvSpPr>
           <p:nvPr>
-            <p:ph type="title" idx="4294967295"/>
+            <p:ph type="title"/>
           </p:nvPr>
         </p:nvSpPr>
         <p:spPr>
-          <a:xfrm>
-            <a:off x="2093913" y="53975"/>
-            <a:ext cx="5113337" cy="1128713"/>
-          </a:xfrm>
           <a:noFill/>
         </p:spPr>
         <p:txBody>
@@ -6223,7 +5967,7 @@
           <a:lstStyle/>
           <a:p>
             <a:r>
-              <a:rPr lang="en-US" sz="4800" smtClean="0"/>
+              <a:rPr lang="en-US" sz="4800" dirty="0" smtClean="0"/>
               <a:t>Hall’s Theorem</a:t>
             </a:r>
           </a:p>
@@ -6259,7 +6003,7 @@
               <a:rPr lang="en-US" dirty="0" smtClean="0"/>
               <a:t> 7F.</a:t>
             </a:r>
-            <a:fld id="{EB9B9B79-C8D9-48F2-B6B6-031FF048EA6F}" type="slidenum">
+            <a:fld id="{EE815EBE-A80C-4F04-9B8C-61CDAF6F5EB4}" type="slidenum">
               <a:rPr lang="en-US" smtClean="0"/>
               <a:pPr>
                 <a:defRPr/>
@@ -6270,1779 +6014,34 @@
           </a:p>
         </p:txBody>
       </p:sp>
-      <p:sp>
-        <p:nvSpPr>
-          <p:cNvPr id="11" name="TextBox 10"/>
-          <p:cNvSpPr txBox="1"/>
-          <p:nvPr/>
-        </p:nvSpPr>
-        <p:spPr>
-          <a:xfrm>
-            <a:off x="2713038" y="1027344"/>
-            <a:ext cx="3159639" cy="584776"/>
-          </a:xfrm>
-          <a:prstGeom prst="rect">
-            <a:avLst/>
-          </a:prstGeom>
-          <a:noFill/>
-        </p:spPr>
-        <p:txBody>
-          <a:bodyPr wrap="none">
-            <a:spAutoFit/>
-          </a:bodyPr>
-          <a:lstStyle/>
-          <a:p>
-            <a:pPr>
-              <a:buNone/>
-              <a:defRPr/>
-            </a:pPr>
-            <a:r>
-              <a:rPr lang="en-US" b="1" dirty="0">
-                <a:solidFill>
-                  <a:srgbClr val="0033CC"/>
-                </a:solidFill>
-                <a:latin typeface="+mj-lt"/>
-              </a:rPr>
-              <a:t>Hall’s condition</a:t>
-            </a:r>
-          </a:p>
-        </p:txBody>
-      </p:sp>
-      <p:sp>
-        <p:nvSpPr>
-          <p:cNvPr id="12" name="TextBox 11"/>
-          <p:cNvSpPr txBox="1"/>
-          <p:nvPr/>
-        </p:nvSpPr>
-        <p:spPr>
-          <a:xfrm>
-            <a:off x="1599645" y="4900320"/>
-            <a:ext cx="5984875" cy="1016000"/>
-          </a:xfrm>
-          <a:prstGeom prst="rect">
-            <a:avLst/>
-          </a:prstGeom>
-          <a:noFill/>
-        </p:spPr>
-        <p:txBody>
-          <a:bodyPr wrap="none">
-            <a:spAutoFit/>
-          </a:bodyPr>
-          <a:lstStyle/>
-          <a:p>
-            <a:pPr>
-              <a:buNone/>
-              <a:defRPr/>
-            </a:pPr>
-            <a:r>
-              <a:rPr lang="en-US" sz="6000" dirty="0">
-                <a:latin typeface="+mj-lt"/>
-              </a:rPr>
-              <a:t>(proof in Notes)</a:t>
-            </a:r>
-          </a:p>
-        </p:txBody>
-      </p:sp>
-      <p:sp>
-        <p:nvSpPr>
-          <p:cNvPr id="13" name="Freeform 12"/>
-          <p:cNvSpPr/>
-          <p:nvPr/>
-        </p:nvSpPr>
-        <p:spPr bwMode="auto">
-          <a:xfrm>
-            <a:off x="380605" y="1660123"/>
-            <a:ext cx="7029104" cy="2086253"/>
-          </a:xfrm>
-          <a:custGeom>
-            <a:avLst/>
-            <a:gdLst>
-              <a:gd name="connsiteX0" fmla="*/ 938140 w 7029104"/>
-              <a:gd name="connsiteY0" fmla="*/ 182880 h 1828800"/>
-              <a:gd name="connsiteX1" fmla="*/ 916625 w 7029104"/>
-              <a:gd name="connsiteY1" fmla="*/ 849854 h 1828800"/>
-              <a:gd name="connsiteX2" fmla="*/ 884352 w 7029104"/>
-              <a:gd name="connsiteY2" fmla="*/ 1000461 h 1828800"/>
-              <a:gd name="connsiteX3" fmla="*/ 324954 w 7029104"/>
-              <a:gd name="connsiteY3" fmla="*/ 1075764 h 1828800"/>
-              <a:gd name="connsiteX4" fmla="*/ 152832 w 7029104"/>
-              <a:gd name="connsiteY4" fmla="*/ 1086522 h 1828800"/>
-              <a:gd name="connsiteX5" fmla="*/ 34498 w 7029104"/>
-              <a:gd name="connsiteY5" fmla="*/ 1484555 h 1828800"/>
-              <a:gd name="connsiteX6" fmla="*/ 77528 w 7029104"/>
-              <a:gd name="connsiteY6" fmla="*/ 1742738 h 1828800"/>
-              <a:gd name="connsiteX7" fmla="*/ 1411476 w 7029104"/>
-              <a:gd name="connsiteY7" fmla="*/ 1828800 h 1828800"/>
-              <a:gd name="connsiteX8" fmla="*/ 4810893 w 7029104"/>
-              <a:gd name="connsiteY8" fmla="*/ 1785769 h 1828800"/>
-              <a:gd name="connsiteX9" fmla="*/ 4972258 w 7029104"/>
-              <a:gd name="connsiteY9" fmla="*/ 1495313 h 1828800"/>
-              <a:gd name="connsiteX10" fmla="*/ 5176653 w 7029104"/>
-              <a:gd name="connsiteY10" fmla="*/ 989703 h 1828800"/>
-              <a:gd name="connsiteX11" fmla="*/ 5208926 w 7029104"/>
-              <a:gd name="connsiteY11" fmla="*/ 935915 h 1828800"/>
-              <a:gd name="connsiteX12" fmla="*/ 6930149 w 7029104"/>
-              <a:gd name="connsiteY12" fmla="*/ 903642 h 1828800"/>
-              <a:gd name="connsiteX13" fmla="*/ 6962422 w 7029104"/>
-              <a:gd name="connsiteY13" fmla="*/ 860611 h 1828800"/>
-              <a:gd name="connsiteX14" fmla="*/ 7026968 w 7029104"/>
-              <a:gd name="connsiteY14" fmla="*/ 268941 h 1828800"/>
-              <a:gd name="connsiteX15" fmla="*/ 6951665 w 7029104"/>
-              <a:gd name="connsiteY15" fmla="*/ 10757 h 1828800"/>
-              <a:gd name="connsiteX16" fmla="*/ 1067232 w 7029104"/>
-              <a:gd name="connsiteY16" fmla="*/ 0 h 1828800"/>
-              <a:gd name="connsiteX17" fmla="*/ 938140 w 7029104"/>
-              <a:gd name="connsiteY17" fmla="*/ 182880 h 1828800"/>
-            </a:gdLst>
-            <a:ahLst/>
-            <a:cxnLst>
-              <a:cxn ang="0">
-                <a:pos x="connsiteX0" y="connsiteY0"/>
-              </a:cxn>
-              <a:cxn ang="0">
-                <a:pos x="connsiteX1" y="connsiteY1"/>
-              </a:cxn>
-              <a:cxn ang="0">
-                <a:pos x="connsiteX2" y="connsiteY2"/>
-              </a:cxn>
-              <a:cxn ang="0">
-                <a:pos x="connsiteX3" y="connsiteY3"/>
-              </a:cxn>
-              <a:cxn ang="0">
-                <a:pos x="connsiteX4" y="connsiteY4"/>
-              </a:cxn>
-              <a:cxn ang="0">
-                <a:pos x="connsiteX5" y="connsiteY5"/>
-              </a:cxn>
-              <a:cxn ang="0">
-                <a:pos x="connsiteX6" y="connsiteY6"/>
-              </a:cxn>
-              <a:cxn ang="0">
-                <a:pos x="connsiteX7" y="connsiteY7"/>
-              </a:cxn>
-              <a:cxn ang="0">
-                <a:pos x="connsiteX8" y="connsiteY8"/>
-              </a:cxn>
-              <a:cxn ang="0">
-                <a:pos x="connsiteX9" y="connsiteY9"/>
-              </a:cxn>
-              <a:cxn ang="0">
-                <a:pos x="connsiteX10" y="connsiteY10"/>
-              </a:cxn>
-              <a:cxn ang="0">
-                <a:pos x="connsiteX11" y="connsiteY11"/>
-              </a:cxn>
-              <a:cxn ang="0">
-                <a:pos x="connsiteX12" y="connsiteY12"/>
-              </a:cxn>
-              <a:cxn ang="0">
-                <a:pos x="connsiteX13" y="connsiteY13"/>
-              </a:cxn>
-              <a:cxn ang="0">
-                <a:pos x="connsiteX14" y="connsiteY14"/>
-              </a:cxn>
-              <a:cxn ang="0">
-                <a:pos x="connsiteX15" y="connsiteY15"/>
-              </a:cxn>
-              <a:cxn ang="0">
-                <a:pos x="connsiteX16" y="connsiteY16"/>
-              </a:cxn>
-              <a:cxn ang="0">
-                <a:pos x="connsiteX17" y="connsiteY17"/>
-              </a:cxn>
-            </a:cxnLst>
-            <a:rect l="l" t="t" r="r" b="b"/>
-            <a:pathLst>
-              <a:path w="7029104" h="1828800">
-                <a:moveTo>
-                  <a:pt x="938140" y="182880"/>
-                </a:moveTo>
-                <a:lnTo>
-                  <a:pt x="916625" y="849854"/>
-                </a:lnTo>
-                <a:lnTo>
-                  <a:pt x="884352" y="1000461"/>
-                </a:lnTo>
-                <a:lnTo>
-                  <a:pt x="324954" y="1075764"/>
-                </a:lnTo>
-                <a:cubicBezTo>
-                  <a:pt x="155589" y="1064474"/>
-                  <a:pt x="187696" y="1016790"/>
-                  <a:pt x="152832" y="1086522"/>
-                </a:cubicBezTo>
-                <a:lnTo>
-                  <a:pt x="34498" y="1484555"/>
-                </a:lnTo>
-                <a:cubicBezTo>
-                  <a:pt x="56931" y="1731324"/>
-                  <a:pt x="0" y="1665210"/>
-                  <a:pt x="77528" y="1742738"/>
-                </a:cubicBezTo>
-                <a:cubicBezTo>
-                  <a:pt x="522147" y="1771894"/>
-                  <a:pt x="965902" y="1828800"/>
-                  <a:pt x="1411476" y="1828800"/>
-                </a:cubicBezTo>
-                <a:lnTo>
-                  <a:pt x="4810893" y="1785769"/>
-                </a:lnTo>
-                <a:lnTo>
-                  <a:pt x="4972258" y="1495313"/>
-                </a:lnTo>
-                <a:cubicBezTo>
-                  <a:pt x="5040390" y="1326776"/>
-                  <a:pt x="5109139" y="1158488"/>
-                  <a:pt x="5176653" y="989703"/>
-                </a:cubicBezTo>
-                <a:cubicBezTo>
-                  <a:pt x="5195273" y="943154"/>
-                  <a:pt x="5175230" y="969611"/>
-                  <a:pt x="5208926" y="935915"/>
-                </a:cubicBezTo>
-                <a:lnTo>
-                  <a:pt x="6930149" y="903642"/>
-                </a:lnTo>
-                <a:cubicBezTo>
-                  <a:pt x="6943957" y="903216"/>
-                  <a:pt x="6957706" y="870044"/>
-                  <a:pt x="6962422" y="860611"/>
-                </a:cubicBezTo>
-                <a:cubicBezTo>
-                  <a:pt x="7029104" y="304927"/>
-                  <a:pt x="7026968" y="503309"/>
-                  <a:pt x="7026968" y="268941"/>
-                </a:cubicBezTo>
-                <a:lnTo>
-                  <a:pt x="6951665" y="10757"/>
-                </a:lnTo>
-                <a:lnTo>
-                  <a:pt x="1067232" y="0"/>
-                </a:lnTo>
-                <a:lnTo>
-                  <a:pt x="938140" y="182880"/>
-                </a:lnTo>
-                <a:close/>
-              </a:path>
-            </a:pathLst>
-          </a:custGeom>
-          <a:noFill/>
-          <a:ln w="41275" cap="flat" cmpd="sng" algn="ctr">
-            <a:solidFill>
-              <a:srgbClr val="FF00FF"/>
-            </a:solidFill>
-            <a:prstDash val="sysDash"/>
-            <a:round/>
-            <a:headEnd type="none" w="med" len="med"/>
-            <a:tailEnd type="stealth" w="lg" len="lg"/>
-          </a:ln>
-          <a:effectLst/>
-        </p:spPr>
-        <p:txBody>
-          <a:bodyPr vert="horz" wrap="square" lIns="91440" tIns="45720" rIns="91440" bIns="45720" numCol="1" rtlCol="0" anchor="t" anchorCtr="0" compatLnSpc="1">
-            <a:prstTxWarp prst="textNoShape">
-              <a:avLst/>
-            </a:prstTxWarp>
-          </a:bodyPr>
-          <a:lstStyle/>
-          <a:p>
-            <a:pPr>
-              <a:spcBef>
-                <a:spcPct val="0"/>
-              </a:spcBef>
-              <a:buNone/>
-            </a:pPr>
-            <a:endParaRPr kumimoji="0" lang="en-US" sz="4000" b="0" i="0" u="none" strike="noStrike" cap="none" normalizeH="0" baseline="0" smtClean="0">
-              <a:ln>
-                <a:noFill/>
-              </a:ln>
-              <a:solidFill>
-                <a:schemeClr val="tx1"/>
-              </a:solidFill>
-              <a:effectLst/>
-              <a:latin typeface="Arial" pitchFamily="34" charset="0"/>
-            </a:endParaRPr>
-          </a:p>
-        </p:txBody>
-      </p:sp>
     </p:spTree>
     <p:extLst>
       <p:ext uri="{BB962C8B-B14F-4D97-AF65-F5344CB8AC3E}">
-        <p14:creationId xmlns:p14="http://schemas.microsoft.com/office/powerpoint/2010/main" val="1723280972"/>
+        <p14:creationId xmlns:p14="http://schemas.microsoft.com/office/powerpoint/2010/main" val="3428000925"/>
       </p:ext>
     </p:extLst>
   </p:cSld>
   <p:clrMapOvr>
     <a:masterClrMapping/>
   </p:clrMapOvr>
-  <p:transition xmlns:p14="http://schemas.microsoft.com/office/powerpoint/2010/main">
-    <p:fade/>
-  </p:transition>
+  <mc:AlternateContent xmlns:mc="http://schemas.openxmlformats.org/markup-compatibility/2006" xmlns:p14="http://schemas.microsoft.com/office/powerpoint/2010/main">
+    <mc:Choice Requires="p14">
+      <p:transition spd="slow" p14:dur="900">
+        <p:fade thruBlk="1"/>
+      </p:transition>
+    </mc:Choice>
+    <mc:Fallback xmlns="">
+      <p:transition xmlns:p14="http://schemas.microsoft.com/office/powerpoint/2010/main" spd="slow">
+        <p:fade thruBlk="1"/>
+      </p:transition>
+    </mc:Fallback>
+  </mc:AlternateContent>
   <p:timing>
     <p:tnLst>
       <p:par>
-        <p:cTn xmlns:p14="http://schemas.microsoft.com/office/powerpoint/2010/main" id="1" dur="indefinite" restart="never" nodeType="tmRoot">
-          <p:childTnLst>
-            <p:seq concurrent="1" nextAc="seek">
-              <p:cTn id="2" dur="indefinite" nodeType="mainSeq">
-                <p:childTnLst>
-                  <p:par>
-                    <p:cTn id="3" fill="hold">
-                      <p:stCondLst>
-                        <p:cond delay="indefinite"/>
-                      </p:stCondLst>
-                      <p:childTnLst>
-                        <p:par>
-                          <p:cTn id="4" fill="hold">
-                            <p:stCondLst>
-                              <p:cond delay="0"/>
-                            </p:stCondLst>
-                            <p:childTnLst>
-                              <p:par>
-                                <p:cTn id="5" presetID="22" presetClass="entr" presetSubtype="1" fill="hold" nodeType="clickEffect">
-                                  <p:stCondLst>
-                                    <p:cond delay="0"/>
-                                  </p:stCondLst>
-                                  <p:childTnLst>
-                                    <p:set>
-                                      <p:cBhvr>
-                                        <p:cTn id="6" dur="1" fill="hold">
-                                          <p:stCondLst>
-                                            <p:cond delay="0"/>
-                                          </p:stCondLst>
-                                        </p:cTn>
-                                        <p:tgtEl>
-                                          <p:spTgt spid="11">
-                                            <p:txEl>
-                                              <p:pRg st="0" end="0"/>
-                                            </p:txEl>
-                                          </p:spTgt>
-                                        </p:tgtEl>
-                                        <p:attrNameLst>
-                                          <p:attrName>style.visibility</p:attrName>
-                                        </p:attrNameLst>
-                                      </p:cBhvr>
-                                      <p:to>
-                                        <p:strVal val="visible"/>
-                                      </p:to>
-                                    </p:set>
-                                    <p:animEffect transition="in" filter="wipe(up)">
-                                      <p:cBhvr>
-                                        <p:cTn id="7" dur="500"/>
-                                        <p:tgtEl>
-                                          <p:spTgt spid="11">
-                                            <p:txEl>
-                                              <p:pRg st="0" end="0"/>
-                                            </p:txEl>
-                                          </p:spTgt>
-                                        </p:tgtEl>
-                                      </p:cBhvr>
-                                    </p:animEffect>
-                                  </p:childTnLst>
-                                </p:cTn>
-                              </p:par>
-                              <p:par>
-                                <p:cTn id="8" presetID="23" presetClass="entr" presetSubtype="16" fill="hold" grpId="0" nodeType="withEffect">
-                                  <p:stCondLst>
-                                    <p:cond delay="0"/>
-                                  </p:stCondLst>
-                                  <p:childTnLst>
-                                    <p:set>
-                                      <p:cBhvr>
-                                        <p:cTn id="9" dur="1" fill="hold">
-                                          <p:stCondLst>
-                                            <p:cond delay="0"/>
-                                          </p:stCondLst>
-                                        </p:cTn>
-                                        <p:tgtEl>
-                                          <p:spTgt spid="13"/>
-                                        </p:tgtEl>
-                                        <p:attrNameLst>
-                                          <p:attrName>style.visibility</p:attrName>
-                                        </p:attrNameLst>
-                                      </p:cBhvr>
-                                      <p:to>
-                                        <p:strVal val="visible"/>
-                                      </p:to>
-                                    </p:set>
-                                    <p:anim calcmode="lin" valueType="num">
-                                      <p:cBhvr>
-                                        <p:cTn id="10" dur="500" fill="hold"/>
-                                        <p:tgtEl>
-                                          <p:spTgt spid="13"/>
-                                        </p:tgtEl>
-                                        <p:attrNameLst>
-                                          <p:attrName>ppt_w</p:attrName>
-                                        </p:attrNameLst>
-                                      </p:cBhvr>
-                                      <p:tavLst>
-                                        <p:tav tm="0">
-                                          <p:val>
-                                            <p:fltVal val="0"/>
-                                          </p:val>
-                                        </p:tav>
-                                        <p:tav tm="100000">
-                                          <p:val>
-                                            <p:strVal val="#ppt_w"/>
-                                          </p:val>
-                                        </p:tav>
-                                      </p:tavLst>
-                                    </p:anim>
-                                    <p:anim calcmode="lin" valueType="num">
-                                      <p:cBhvr>
-                                        <p:cTn id="11" dur="500" fill="hold"/>
-                                        <p:tgtEl>
-                                          <p:spTgt spid="13"/>
-                                        </p:tgtEl>
-                                        <p:attrNameLst>
-                                          <p:attrName>ppt_h</p:attrName>
-                                        </p:attrNameLst>
-                                      </p:cBhvr>
-                                      <p:tavLst>
-                                        <p:tav tm="0">
-                                          <p:val>
-                                            <p:fltVal val="0"/>
-                                          </p:val>
-                                        </p:tav>
-                                        <p:tav tm="100000">
-                                          <p:val>
-                                            <p:strVal val="#ppt_h"/>
-                                          </p:val>
-                                        </p:tav>
-                                      </p:tavLst>
-                                    </p:anim>
-                                  </p:childTnLst>
-                                </p:cTn>
-                              </p:par>
-                            </p:childTnLst>
-                          </p:cTn>
-                        </p:par>
-                      </p:childTnLst>
-                    </p:cTn>
-                  </p:par>
-                  <p:par>
-                    <p:cTn id="12" fill="hold">
-                      <p:stCondLst>
-                        <p:cond delay="indefinite"/>
-                      </p:stCondLst>
-                      <p:childTnLst>
-                        <p:par>
-                          <p:cTn id="13" fill="hold">
-                            <p:stCondLst>
-                              <p:cond delay="0"/>
-                            </p:stCondLst>
-                            <p:childTnLst>
-                              <p:par>
-                                <p:cTn id="14" presetID="1" presetClass="entr" presetSubtype="0" fill="hold" nodeType="clickEffect">
-                                  <p:stCondLst>
-                                    <p:cond delay="0"/>
-                                  </p:stCondLst>
-                                  <p:childTnLst>
-                                    <p:set>
-                                      <p:cBhvr>
-                                        <p:cTn id="15" dur="1" fill="hold">
-                                          <p:stCondLst>
-                                            <p:cond delay="0"/>
-                                          </p:stCondLst>
-                                        </p:cTn>
-                                        <p:tgtEl>
-                                          <p:spTgt spid="12">
-                                            <p:txEl>
-                                              <p:pRg st="0" end="0"/>
-                                            </p:txEl>
-                                          </p:spTgt>
-                                        </p:tgtEl>
-                                        <p:attrNameLst>
-                                          <p:attrName>style.visibility</p:attrName>
-                                        </p:attrNameLst>
-                                      </p:cBhvr>
-                                      <p:to>
-                                        <p:strVal val="visible"/>
-                                      </p:to>
-                                    </p:set>
-                                  </p:childTnLst>
-                                </p:cTn>
-                              </p:par>
-                            </p:childTnLst>
-                          </p:cTn>
-                        </p:par>
-                      </p:childTnLst>
-                    </p:cTn>
-                  </p:par>
-                </p:childTnLst>
-              </p:cTn>
-              <p:prevCondLst>
-                <p:cond evt="onPrev" delay="0">
-                  <p:tgtEl>
-                    <p:sldTgt/>
-                  </p:tgtEl>
-                </p:cond>
-              </p:prevCondLst>
-              <p:nextCondLst>
-                <p:cond evt="onNext" delay="0">
-                  <p:tgtEl>
-                    <p:sldTgt/>
-                  </p:tgtEl>
-                </p:cond>
-              </p:nextCondLst>
-            </p:seq>
-          </p:childTnLst>
-        </p:cTn>
+        <p:cTn xmlns:p14="http://schemas.microsoft.com/office/powerpoint/2010/main" id="1" dur="indefinite" restart="never" nodeType="tmRoot"/>
       </p:par>
     </p:tnLst>
-    <p:bldLst>
-      <p:bldP spid="13" grpId="0" animBg="1"/>
-    </p:bldLst>
-  </p:timing>
-</p:sld>
-</file>
-
-<file path=ppt/slides/slide14.xml><?xml version="1.0" encoding="utf-8"?>
-<p:sld xmlns:a="http://schemas.openxmlformats.org/drawingml/2006/main" xmlns:r="http://schemas.openxmlformats.org/officeDocument/2006/relationships" xmlns:p="http://schemas.openxmlformats.org/presentationml/2006/main">
-  <p:cSld>
-    <p:spTree>
-      <p:nvGrpSpPr>
-        <p:cNvPr id="1" name=""/>
-        <p:cNvGrpSpPr/>
-        <p:nvPr/>
-      </p:nvGrpSpPr>
-      <p:grpSpPr>
-        <a:xfrm>
-          <a:off x="0" y="0"/>
-          <a:ext cx="0" cy="0"/>
-          <a:chOff x="0" y="0"/>
-          <a:chExt cx="0" cy="0"/>
-        </a:xfrm>
-      </p:grpSpPr>
-      <p:sp>
-        <p:nvSpPr>
-          <p:cNvPr id="12292" name="Text Box 2"/>
-          <p:cNvSpPr txBox="1">
-            <a:spLocks noChangeArrowheads="1"/>
-          </p:cNvSpPr>
-          <p:nvPr/>
-        </p:nvSpPr>
-        <p:spPr bwMode="auto">
-          <a:xfrm>
-            <a:off x="1143000" y="228600"/>
-            <a:ext cx="6220974" cy="584776"/>
-          </a:xfrm>
-          <a:prstGeom prst="rect">
-            <a:avLst/>
-          </a:prstGeom>
-          <a:noFill/>
-          <a:ln w="38100">
-            <a:noFill/>
-            <a:miter lim="800000"/>
-            <a:headEnd/>
-            <a:tailEnd type="none" w="lg" len="lg"/>
-          </a:ln>
-        </p:spPr>
-        <p:txBody>
-          <a:bodyPr wrap="none">
-            <a:spAutoFit/>
-          </a:bodyPr>
-          <a:lstStyle/>
-          <a:p>
-            <a:pPr>
-              <a:buNone/>
-            </a:pPr>
-            <a:r>
-              <a:rPr lang="en-US" b="1">
-                <a:latin typeface="Comic Sans MS" pitchFamily="8" charset="0"/>
-              </a:rPr>
-              <a:t>How to verify no bottlenecks?</a:t>
-            </a:r>
-          </a:p>
-        </p:txBody>
-      </p:sp>
-      <p:sp>
-        <p:nvSpPr>
-          <p:cNvPr id="285699" name="Text Box 3"/>
-          <p:cNvSpPr txBox="1">
-            <a:spLocks noChangeArrowheads="1"/>
-          </p:cNvSpPr>
-          <p:nvPr/>
-        </p:nvSpPr>
-        <p:spPr bwMode="auto">
-          <a:xfrm>
-            <a:off x="519876" y="1104057"/>
-            <a:ext cx="8428815" cy="2511456"/>
-          </a:xfrm>
-          <a:prstGeom prst="rect">
-            <a:avLst/>
-          </a:prstGeom>
-          <a:noFill/>
-          <a:ln w="38100">
-            <a:noFill/>
-            <a:miter lim="800000"/>
-            <a:headEnd/>
-            <a:tailEnd type="none" w="lg" len="lg"/>
-          </a:ln>
-        </p:spPr>
-        <p:txBody>
-          <a:bodyPr wrap="square">
-            <a:spAutoFit/>
-          </a:bodyPr>
-          <a:lstStyle/>
-          <a:p>
-            <a:pPr>
-              <a:buNone/>
-            </a:pPr>
-            <a:r>
-              <a:rPr lang="en-US" sz="5400" dirty="0" smtClean="0">
-                <a:latin typeface="Comic Sans MS" pitchFamily="8" charset="0"/>
-              </a:rPr>
-              <a:t>fairly efficient matching</a:t>
-            </a:r>
-          </a:p>
-          <a:p>
-            <a:pPr>
-              <a:buNone/>
-            </a:pPr>
-            <a:r>
-              <a:rPr lang="en-US" sz="5400" dirty="0" smtClean="0">
-                <a:latin typeface="Comic Sans MS" pitchFamily="8" charset="0"/>
-              </a:rPr>
-              <a:t>procedure is known</a:t>
-            </a:r>
-          </a:p>
-          <a:p>
-            <a:pPr>
-              <a:buNone/>
-            </a:pPr>
-            <a:r>
-              <a:rPr lang="en-US" dirty="0" smtClean="0">
-                <a:latin typeface="Comic Sans MS" pitchFamily="8" charset="0"/>
-              </a:rPr>
-              <a:t>(explained in algorithms subjects)</a:t>
-            </a:r>
-          </a:p>
-        </p:txBody>
-      </p:sp>
-      <p:graphicFrame>
-        <p:nvGraphicFramePr>
-          <p:cNvPr id="12290" name="Object 4"/>
-          <p:cNvGraphicFramePr>
-            <a:graphicFrameLocks noChangeAspect="1"/>
-          </p:cNvGraphicFramePr>
-          <p:nvPr>
-            <p:extLst>
-              <p:ext uri="{D42A27DB-BD31-4B8C-83A1-F6EECF244321}">
-                <p14:modId xmlns:p14="http://schemas.microsoft.com/office/powerpoint/2010/main" val="4274353624"/>
-              </p:ext>
-            </p:extLst>
-          </p:nvPr>
-        </p:nvGraphicFramePr>
-        <p:xfrm>
-          <a:off x="3594100" y="3225800"/>
-          <a:ext cx="914400" cy="198438"/>
-        </p:xfrm>
-        <a:graphic>
-          <a:graphicData uri="http://schemas.openxmlformats.org/presentationml/2006/ole">
-            <mc:AlternateContent xmlns:mc="http://schemas.openxmlformats.org/markup-compatibility/2006">
-              <mc:Choice xmlns:v="urn:schemas-microsoft-com:vml" Requires="v">
-                <p:oleObj spid="_x0000_s1052" name="Equation" r:id="rId4" imgW="914400" imgH="198720" progId="">
-                  <p:embed/>
-                </p:oleObj>
-              </mc:Choice>
-              <mc:Fallback>
-                <p:oleObj name="Equation" r:id="rId4" imgW="914400" imgH="198720" progId="">
-                  <p:embed/>
-                  <p:pic>
-                    <p:nvPicPr>
-                      <p:cNvPr id="0" name=""/>
-                      <p:cNvPicPr>
-                        <a:picLocks noChangeAspect="1" noChangeArrowheads="1"/>
-                      </p:cNvPicPr>
-                      <p:nvPr/>
-                    </p:nvPicPr>
-                    <p:blipFill>
-                      <a:blip r:embed="rId5">
-                        <a:extLst>
-                          <a:ext uri="{28A0092B-C50C-407E-A947-70E740481C1C}">
-                            <a14:useLocalDpi xmlns:a14="http://schemas.microsoft.com/office/drawing/2010/main" val="0"/>
-                          </a:ext>
-                        </a:extLst>
-                      </a:blip>
-                      <a:srcRect/>
-                      <a:stretch>
-                        <a:fillRect/>
-                      </a:stretch>
-                    </p:blipFill>
-                    <p:spPr bwMode="auto">
-                      <a:xfrm>
-                        <a:off x="3594100" y="3225800"/>
-                        <a:ext cx="914400" cy="198438"/>
-                      </a:xfrm>
-                      <a:prstGeom prst="rect">
-                        <a:avLst/>
-                      </a:prstGeom>
-                      <a:noFill/>
-                      <a:extLst>
-                        <a:ext uri="{909E8E84-426E-40dd-AFC4-6F175D3DCCD1}">
-                          <a14:hiddenFill xmlns:a14="http://schemas.microsoft.com/office/drawing/2010/main">
-                            <a:solidFill>
-                              <a:srgbClr val="FFFFFF"/>
-                            </a:solidFill>
-                          </a14:hiddenFill>
-                        </a:ext>
-                      </a:extLst>
-                    </p:spPr>
-                  </p:pic>
-                </p:oleObj>
-              </mc:Fallback>
-            </mc:AlternateContent>
-          </a:graphicData>
-        </a:graphic>
-      </p:graphicFrame>
-      <p:graphicFrame>
-        <p:nvGraphicFramePr>
-          <p:cNvPr id="12291" name="Object 7"/>
-          <p:cNvGraphicFramePr>
-            <a:graphicFrameLocks noChangeAspect="1"/>
-          </p:cNvGraphicFramePr>
-          <p:nvPr>
-            <p:extLst>
-              <p:ext uri="{D42A27DB-BD31-4B8C-83A1-F6EECF244321}">
-                <p14:modId xmlns:p14="http://schemas.microsoft.com/office/powerpoint/2010/main" val="1435842383"/>
-              </p:ext>
-            </p:extLst>
-          </p:nvPr>
-        </p:nvGraphicFramePr>
-        <p:xfrm>
-          <a:off x="3594100" y="3225800"/>
-          <a:ext cx="914400" cy="198438"/>
-        </p:xfrm>
-        <a:graphic>
-          <a:graphicData uri="http://schemas.openxmlformats.org/presentationml/2006/ole">
-            <mc:AlternateContent xmlns:mc="http://schemas.openxmlformats.org/markup-compatibility/2006">
-              <mc:Choice xmlns:v="urn:schemas-microsoft-com:vml" Requires="v">
-                <p:oleObj spid="_x0000_s1053" name="Equation" r:id="rId6" imgW="914400" imgH="198720" progId="Equation.3">
-                  <p:embed/>
-                </p:oleObj>
-              </mc:Choice>
-              <mc:Fallback>
-                <p:oleObj name="Equation" r:id="rId6" imgW="914400" imgH="198720" progId="Equation.3">
-                  <p:embed/>
-                  <p:pic>
-                    <p:nvPicPr>
-                      <p:cNvPr id="0" name=""/>
-                      <p:cNvPicPr>
-                        <a:picLocks noChangeAspect="1" noChangeArrowheads="1"/>
-                      </p:cNvPicPr>
-                      <p:nvPr/>
-                    </p:nvPicPr>
-                    <p:blipFill>
-                      <a:blip r:embed="rId5">
-                        <a:extLst>
-                          <a:ext uri="{28A0092B-C50C-407E-A947-70E740481C1C}">
-                            <a14:useLocalDpi xmlns:a14="http://schemas.microsoft.com/office/drawing/2010/main" val="0"/>
-                          </a:ext>
-                        </a:extLst>
-                      </a:blip>
-                      <a:srcRect/>
-                      <a:stretch>
-                        <a:fillRect/>
-                      </a:stretch>
-                    </p:blipFill>
-                    <p:spPr bwMode="auto">
-                      <a:xfrm>
-                        <a:off x="3594100" y="3225800"/>
-                        <a:ext cx="914400" cy="198438"/>
-                      </a:xfrm>
-                      <a:prstGeom prst="rect">
-                        <a:avLst/>
-                      </a:prstGeom>
-                      <a:noFill/>
-                      <a:extLst>
-                        <a:ext uri="{909E8E84-426E-40dd-AFC4-6F175D3DCCD1}">
-                          <a14:hiddenFill xmlns:a14="http://schemas.microsoft.com/office/drawing/2010/main">
-                            <a:solidFill>
-                              <a:srgbClr val="FFFFFF"/>
-                            </a:solidFill>
-                          </a14:hiddenFill>
-                        </a:ext>
-                      </a:extLst>
-                    </p:spPr>
-                  </p:pic>
-                </p:oleObj>
-              </mc:Fallback>
-            </mc:AlternateContent>
-          </a:graphicData>
-        </a:graphic>
-      </p:graphicFrame>
-      <p:sp>
-        <p:nvSpPr>
-          <p:cNvPr id="12" name="Slide Number Placeholder 11"/>
-          <p:cNvSpPr>
-            <a:spLocks noGrp="1" noChangeArrowheads="1"/>
-          </p:cNvSpPr>
-          <p:nvPr>
-            <p:ph type="sldNum" sz="quarter" idx="10"/>
-          </p:nvPr>
-        </p:nvSpPr>
-        <p:spPr/>
-        <p:txBody>
-          <a:bodyPr/>
-          <a:lstStyle>
-            <a:lvl1pPr>
-              <a:defRPr/>
-            </a:lvl1pPr>
-          </a:lstStyle>
-          <a:p>
-            <a:pPr>
-              <a:defRPr/>
-            </a:pPr>
-            <a:r>
-              <a:rPr lang="en-US" dirty="0" err="1" smtClean="0"/>
-              <a:t>lec</a:t>
-            </a:r>
-            <a:r>
-              <a:rPr lang="en-US" dirty="0" smtClean="0"/>
-              <a:t> 7F.</a:t>
-            </a:r>
-            <a:fld id="{BF4B27A8-4FA1-4DF7-89DB-09404700A23C}" type="slidenum">
-              <a:rPr lang="en-US" smtClean="0"/>
-              <a:pPr>
-                <a:defRPr/>
-              </a:pPr>
-              <a:t>14</a:t>
-            </a:fld>
-            <a:endParaRPr lang="en-US" dirty="0"/>
-          </a:p>
-        </p:txBody>
-      </p:sp>
-      <p:sp>
-        <p:nvSpPr>
-          <p:cNvPr id="13" name="TextBox 12"/>
-          <p:cNvSpPr txBox="1"/>
-          <p:nvPr/>
-        </p:nvSpPr>
-        <p:spPr>
-          <a:xfrm>
-            <a:off x="494425" y="3689769"/>
-            <a:ext cx="8010382" cy="2585323"/>
-          </a:xfrm>
-          <a:prstGeom prst="rect">
-            <a:avLst/>
-          </a:prstGeom>
-          <a:noFill/>
-        </p:spPr>
-        <p:txBody>
-          <a:bodyPr wrap="square" rtlCol="0">
-            <a:spAutoFit/>
-          </a:bodyPr>
-          <a:lstStyle/>
-          <a:p>
-            <a:pPr>
-              <a:buNone/>
-            </a:pPr>
-            <a:r>
-              <a:rPr lang="en-US" sz="5400" dirty="0" smtClean="0">
-                <a:latin typeface="+mj-lt"/>
-              </a:rPr>
-              <a:t>…but there is a </a:t>
-            </a:r>
-            <a:r>
-              <a:rPr lang="en-US" sz="5400" dirty="0" smtClean="0">
-                <a:solidFill>
-                  <a:srgbClr val="008000"/>
-                </a:solidFill>
-                <a:latin typeface="+mj-lt"/>
-              </a:rPr>
-              <a:t>special situation</a:t>
-            </a:r>
-            <a:r>
-              <a:rPr lang="en-US" sz="5400" dirty="0" smtClean="0">
-                <a:latin typeface="+mj-lt"/>
-              </a:rPr>
-              <a:t> that ensures a match…</a:t>
-            </a:r>
-          </a:p>
-        </p:txBody>
-      </p:sp>
-    </p:spTree>
-    <p:extLst>
-      <p:ext uri="{BB962C8B-B14F-4D97-AF65-F5344CB8AC3E}">
-        <p14:creationId xmlns:p14="http://schemas.microsoft.com/office/powerpoint/2010/main" val="4086116441"/>
-      </p:ext>
-    </p:extLst>
-  </p:cSld>
-  <p:clrMapOvr>
-    <a:masterClrMapping/>
-  </p:clrMapOvr>
-  <p:transition xmlns:p14="http://schemas.microsoft.com/office/powerpoint/2010/main">
-    <p:fade thruBlk="1"/>
-  </p:transition>
-  <p:timing>
-    <p:tnLst>
-      <p:par>
-        <p:cTn xmlns:p14="http://schemas.microsoft.com/office/powerpoint/2010/main" id="1" dur="indefinite" restart="never" nodeType="tmRoot">
-          <p:childTnLst>
-            <p:seq concurrent="1" nextAc="seek">
-              <p:cTn id="2" dur="indefinite" nodeType="mainSeq">
-                <p:childTnLst>
-                  <p:par>
-                    <p:cTn id="3" fill="hold">
-                      <p:stCondLst>
-                        <p:cond delay="indefinite"/>
-                      </p:stCondLst>
-                      <p:childTnLst>
-                        <p:par>
-                          <p:cTn id="4" fill="hold">
-                            <p:stCondLst>
-                              <p:cond delay="0"/>
-                            </p:stCondLst>
-                            <p:childTnLst>
-                              <p:par>
-                                <p:cTn id="5" presetID="1" presetClass="entr" presetSubtype="0" fill="hold" nodeType="clickEffect">
-                                  <p:stCondLst>
-                                    <p:cond delay="0"/>
-                                  </p:stCondLst>
-                                  <p:childTnLst>
-                                    <p:set>
-                                      <p:cBhvr>
-                                        <p:cTn id="6" dur="1" fill="hold">
-                                          <p:stCondLst>
-                                            <p:cond delay="0"/>
-                                          </p:stCondLst>
-                                        </p:cTn>
-                                        <p:tgtEl>
-                                          <p:spTgt spid="285699">
-                                            <p:txEl>
-                                              <p:pRg st="2" end="2"/>
-                                            </p:txEl>
-                                          </p:spTgt>
-                                        </p:tgtEl>
-                                        <p:attrNameLst>
-                                          <p:attrName>style.visibility</p:attrName>
-                                        </p:attrNameLst>
-                                      </p:cBhvr>
-                                      <p:to>
-                                        <p:strVal val="visible"/>
-                                      </p:to>
-                                    </p:set>
-                                  </p:childTnLst>
-                                </p:cTn>
-                              </p:par>
-                            </p:childTnLst>
-                          </p:cTn>
-                        </p:par>
-                      </p:childTnLst>
-                    </p:cTn>
-                  </p:par>
-                  <p:par>
-                    <p:cTn id="7" fill="hold">
-                      <p:stCondLst>
-                        <p:cond delay="indefinite"/>
-                      </p:stCondLst>
-                      <p:childTnLst>
-                        <p:par>
-                          <p:cTn id="8" fill="hold">
-                            <p:stCondLst>
-                              <p:cond delay="0"/>
-                            </p:stCondLst>
-                            <p:childTnLst>
-                              <p:par>
-                                <p:cTn id="9" presetID="22" presetClass="entr" presetSubtype="1" fill="hold" grpId="0" nodeType="clickEffect">
-                                  <p:stCondLst>
-                                    <p:cond delay="0"/>
-                                  </p:stCondLst>
-                                  <p:childTnLst>
-                                    <p:set>
-                                      <p:cBhvr>
-                                        <p:cTn id="10" dur="1" fill="hold">
-                                          <p:stCondLst>
-                                            <p:cond delay="0"/>
-                                          </p:stCondLst>
-                                        </p:cTn>
-                                        <p:tgtEl>
-                                          <p:spTgt spid="13"/>
-                                        </p:tgtEl>
-                                        <p:attrNameLst>
-                                          <p:attrName>style.visibility</p:attrName>
-                                        </p:attrNameLst>
-                                      </p:cBhvr>
-                                      <p:to>
-                                        <p:strVal val="visible"/>
-                                      </p:to>
-                                    </p:set>
-                                    <p:animEffect transition="in" filter="wipe(up)">
-                                      <p:cBhvr>
-                                        <p:cTn id="11" dur="500"/>
-                                        <p:tgtEl>
-                                          <p:spTgt spid="13"/>
-                                        </p:tgtEl>
-                                      </p:cBhvr>
-                                    </p:animEffect>
-                                  </p:childTnLst>
-                                </p:cTn>
-                              </p:par>
-                            </p:childTnLst>
-                          </p:cTn>
-                        </p:par>
-                      </p:childTnLst>
-                    </p:cTn>
-                  </p:par>
-                </p:childTnLst>
-              </p:cTn>
-              <p:prevCondLst>
-                <p:cond evt="onPrev" delay="0">
-                  <p:tgtEl>
-                    <p:sldTgt/>
-                  </p:tgtEl>
-                </p:cond>
-              </p:prevCondLst>
-              <p:nextCondLst>
-                <p:cond evt="onNext" delay="0">
-                  <p:tgtEl>
-                    <p:sldTgt/>
-                  </p:tgtEl>
-                </p:cond>
-              </p:nextCondLst>
-            </p:seq>
-          </p:childTnLst>
-        </p:cTn>
-      </p:par>
-    </p:tnLst>
-    <p:bldLst>
-      <p:bldP spid="13" grpId="0"/>
-    </p:bldLst>
-  </p:timing>
-</p:sld>
-</file>
-
-<file path=ppt/slides/slide15.xml><?xml version="1.0" encoding="utf-8"?>
-<p:sld xmlns:a="http://schemas.openxmlformats.org/drawingml/2006/main" xmlns:r="http://schemas.openxmlformats.org/officeDocument/2006/relationships" xmlns:p="http://schemas.openxmlformats.org/presentationml/2006/main">
-  <p:cSld>
-    <p:spTree>
-      <p:nvGrpSpPr>
-        <p:cNvPr id="1" name=""/>
-        <p:cNvGrpSpPr/>
-        <p:nvPr/>
-      </p:nvGrpSpPr>
-      <p:grpSpPr>
-        <a:xfrm>
-          <a:off x="0" y="0"/>
-          <a:ext cx="0" cy="0"/>
-          <a:chOff x="0" y="0"/>
-          <a:chExt cx="0" cy="0"/>
-        </a:xfrm>
-      </p:grpSpPr>
-      <p:sp>
-        <p:nvSpPr>
-          <p:cNvPr id="12292" name="Text Box 2"/>
-          <p:cNvSpPr txBox="1">
-            <a:spLocks noChangeArrowheads="1"/>
-          </p:cNvSpPr>
-          <p:nvPr/>
-        </p:nvSpPr>
-        <p:spPr bwMode="auto">
-          <a:xfrm>
-            <a:off x="1143000" y="228600"/>
-            <a:ext cx="6220974" cy="584776"/>
-          </a:xfrm>
-          <a:prstGeom prst="rect">
-            <a:avLst/>
-          </a:prstGeom>
-          <a:noFill/>
-          <a:ln w="38100">
-            <a:noFill/>
-            <a:miter lim="800000"/>
-            <a:headEnd/>
-            <a:tailEnd type="none" w="lg" len="lg"/>
-          </a:ln>
-        </p:spPr>
-        <p:txBody>
-          <a:bodyPr wrap="none">
-            <a:spAutoFit/>
-          </a:bodyPr>
-          <a:lstStyle/>
-          <a:p>
-            <a:pPr>
-              <a:buNone/>
-            </a:pPr>
-            <a:r>
-              <a:rPr lang="en-US" b="1">
-                <a:latin typeface="Comic Sans MS" pitchFamily="8" charset="0"/>
-              </a:rPr>
-              <a:t>How to verify no bottlenecks?</a:t>
-            </a:r>
-          </a:p>
-        </p:txBody>
-      </p:sp>
-      <p:sp>
-        <p:nvSpPr>
-          <p:cNvPr id="285699" name="Text Box 3"/>
-          <p:cNvSpPr txBox="1">
-            <a:spLocks noChangeArrowheads="1"/>
-          </p:cNvSpPr>
-          <p:nvPr/>
-        </p:nvSpPr>
-        <p:spPr bwMode="auto">
-          <a:xfrm>
-            <a:off x="547719" y="995363"/>
-            <a:ext cx="8122736" cy="2394502"/>
-          </a:xfrm>
-          <a:prstGeom prst="rect">
-            <a:avLst/>
-          </a:prstGeom>
-          <a:noFill/>
-          <a:ln w="38100">
-            <a:noFill/>
-            <a:miter lim="800000"/>
-            <a:headEnd/>
-            <a:tailEnd type="none" w="lg" len="lg"/>
-          </a:ln>
-        </p:spPr>
-        <p:txBody>
-          <a:bodyPr wrap="none">
-            <a:spAutoFit/>
-          </a:bodyPr>
-          <a:lstStyle/>
-          <a:p>
-            <a:pPr>
-              <a:buNone/>
-            </a:pPr>
-            <a:r>
-              <a:rPr lang="en-US" sz="4400" dirty="0" smtClean="0">
-                <a:latin typeface="Comic Sans MS" pitchFamily="8" charset="0"/>
-              </a:rPr>
-              <a:t>If every </a:t>
-            </a:r>
-            <a:r>
-              <a:rPr lang="en-US" sz="4400" dirty="0">
-                <a:latin typeface="Comic Sans MS" pitchFamily="8" charset="0"/>
-              </a:rPr>
-              <a:t>girl likes</a:t>
-            </a:r>
-            <a:r>
-              <a:rPr lang="en-US" sz="4400" dirty="0" smtClean="0">
-                <a:latin typeface="Comic Sans MS" pitchFamily="8" charset="0"/>
-              </a:rPr>
-              <a:t> </a:t>
-            </a:r>
-            <a:r>
-              <a:rPr lang="en-US" sz="4400" b="1" dirty="0" smtClean="0">
-                <a:solidFill>
-                  <a:srgbClr val="00B050"/>
-                </a:solidFill>
-                <a:latin typeface="Cambria Math" pitchFamily="18" charset="0"/>
-                <a:ea typeface="Cambria Math" pitchFamily="18" charset="0"/>
-                <a:cs typeface="Euclid Symbol" charset="2"/>
-                <a:sym typeface="Euclid Symbol" pitchFamily="18" charset="2"/>
-              </a:rPr>
-              <a:t>≥</a:t>
-            </a:r>
-            <a:r>
-              <a:rPr lang="en-US" sz="4400" dirty="0" smtClean="0">
-                <a:latin typeface="Comic Sans MS" pitchFamily="8" charset="0"/>
-              </a:rPr>
-              <a:t> </a:t>
-            </a:r>
-            <a:r>
-              <a:rPr lang="en-US" sz="4400" dirty="0">
-                <a:latin typeface="Comic Sans MS" pitchFamily="8" charset="0"/>
-              </a:rPr>
-              <a:t>d  boys</a:t>
-            </a:r>
-            <a:r>
-              <a:rPr lang="en-US" sz="4400" dirty="0" smtClean="0">
-                <a:latin typeface="Comic Sans MS" pitchFamily="8" charset="0"/>
-              </a:rPr>
-              <a:t>,</a:t>
-            </a:r>
-          </a:p>
-          <a:p>
-            <a:pPr>
-              <a:buNone/>
-            </a:pPr>
-            <a:r>
-              <a:rPr lang="en-US" sz="4400" dirty="0" smtClean="0">
-                <a:latin typeface="Comic Sans MS" pitchFamily="8" charset="0"/>
-              </a:rPr>
-              <a:t>and every boy likes </a:t>
-            </a:r>
-            <a:r>
-              <a:rPr lang="en-US" sz="4400" b="1" dirty="0" smtClean="0">
-                <a:solidFill>
-                  <a:srgbClr val="FF00FF"/>
-                </a:solidFill>
-                <a:latin typeface="Cambria Math" pitchFamily="18" charset="0"/>
-                <a:ea typeface="Cambria Math" pitchFamily="18" charset="0"/>
-                <a:cs typeface="Euclid Symbol" charset="2"/>
-                <a:sym typeface="Euclid Symbol" pitchFamily="18" charset="2"/>
-              </a:rPr>
-              <a:t>≤</a:t>
-            </a:r>
-            <a:r>
-              <a:rPr lang="en-US" sz="4400" dirty="0" smtClean="0">
-                <a:latin typeface="Comic Sans MS" pitchFamily="8" charset="0"/>
-              </a:rPr>
-              <a:t> d  girls,</a:t>
-            </a:r>
-            <a:endParaRPr lang="en-US" sz="4400" dirty="0">
-              <a:latin typeface="Comic Sans MS" pitchFamily="8" charset="0"/>
-            </a:endParaRPr>
-          </a:p>
-          <a:p>
-            <a:pPr>
-              <a:buNone/>
-            </a:pPr>
-            <a:r>
-              <a:rPr lang="en-US" sz="4400" dirty="0" smtClean="0">
-                <a:latin typeface="Comic Sans MS" pitchFamily="8" charset="0"/>
-              </a:rPr>
-              <a:t>then </a:t>
-            </a:r>
-            <a:r>
-              <a:rPr lang="en-US" sz="4400" dirty="0">
-                <a:latin typeface="Comic Sans MS" pitchFamily="8" charset="0"/>
-              </a:rPr>
-              <a:t>no bottlenecks.</a:t>
-            </a:r>
-          </a:p>
-        </p:txBody>
-      </p:sp>
-      <p:graphicFrame>
-        <p:nvGraphicFramePr>
-          <p:cNvPr id="12290" name="Object 4"/>
-          <p:cNvGraphicFramePr>
-            <a:graphicFrameLocks noChangeAspect="1"/>
-          </p:cNvGraphicFramePr>
-          <p:nvPr>
-            <p:extLst>
-              <p:ext uri="{D42A27DB-BD31-4B8C-83A1-F6EECF244321}">
-                <p14:modId xmlns:p14="http://schemas.microsoft.com/office/powerpoint/2010/main" val="2652024947"/>
-              </p:ext>
-            </p:extLst>
-          </p:nvPr>
-        </p:nvGraphicFramePr>
-        <p:xfrm>
-          <a:off x="3594100" y="3225800"/>
-          <a:ext cx="914400" cy="198438"/>
-        </p:xfrm>
-        <a:graphic>
-          <a:graphicData uri="http://schemas.openxmlformats.org/presentationml/2006/ole">
-            <mc:AlternateContent xmlns:mc="http://schemas.openxmlformats.org/markup-compatibility/2006">
-              <mc:Choice xmlns:v="urn:schemas-microsoft-com:vml" Requires="v">
-                <p:oleObj spid="_x0000_s2076" name="Equation" r:id="rId4" imgW="914400" imgH="198720" progId="">
-                  <p:embed/>
-                </p:oleObj>
-              </mc:Choice>
-              <mc:Fallback>
-                <p:oleObj name="Equation" r:id="rId4" imgW="914400" imgH="198720" progId="">
-                  <p:embed/>
-                  <p:pic>
-                    <p:nvPicPr>
-                      <p:cNvPr id="0" name=""/>
-                      <p:cNvPicPr>
-                        <a:picLocks noChangeAspect="1" noChangeArrowheads="1"/>
-                      </p:cNvPicPr>
-                      <p:nvPr/>
-                    </p:nvPicPr>
-                    <p:blipFill>
-                      <a:blip r:embed="rId5">
-                        <a:extLst>
-                          <a:ext uri="{28A0092B-C50C-407E-A947-70E740481C1C}">
-                            <a14:useLocalDpi xmlns:a14="http://schemas.microsoft.com/office/drawing/2010/main" val="0"/>
-                          </a:ext>
-                        </a:extLst>
-                      </a:blip>
-                      <a:srcRect/>
-                      <a:stretch>
-                        <a:fillRect/>
-                      </a:stretch>
-                    </p:blipFill>
-                    <p:spPr bwMode="auto">
-                      <a:xfrm>
-                        <a:off x="3594100" y="3225800"/>
-                        <a:ext cx="914400" cy="198438"/>
-                      </a:xfrm>
-                      <a:prstGeom prst="rect">
-                        <a:avLst/>
-                      </a:prstGeom>
-                      <a:noFill/>
-                      <a:extLst>
-                        <a:ext uri="{909E8E84-426E-40dd-AFC4-6F175D3DCCD1}">
-                          <a14:hiddenFill xmlns:a14="http://schemas.microsoft.com/office/drawing/2010/main">
-                            <a:solidFill>
-                              <a:srgbClr val="FFFFFF"/>
-                            </a:solidFill>
-                          </a14:hiddenFill>
-                        </a:ext>
-                      </a:extLst>
-                    </p:spPr>
-                  </p:pic>
-                </p:oleObj>
-              </mc:Fallback>
-            </mc:AlternateContent>
-          </a:graphicData>
-        </a:graphic>
-      </p:graphicFrame>
-      <p:graphicFrame>
-        <p:nvGraphicFramePr>
-          <p:cNvPr id="12291" name="Object 7"/>
-          <p:cNvGraphicFramePr>
-            <a:graphicFrameLocks noChangeAspect="1"/>
-          </p:cNvGraphicFramePr>
-          <p:nvPr>
-            <p:extLst>
-              <p:ext uri="{D42A27DB-BD31-4B8C-83A1-F6EECF244321}">
-                <p14:modId xmlns:p14="http://schemas.microsoft.com/office/powerpoint/2010/main" val="658701749"/>
-              </p:ext>
-            </p:extLst>
-          </p:nvPr>
-        </p:nvGraphicFramePr>
-        <p:xfrm>
-          <a:off x="3594100" y="3225800"/>
-          <a:ext cx="914400" cy="198438"/>
-        </p:xfrm>
-        <a:graphic>
-          <a:graphicData uri="http://schemas.openxmlformats.org/presentationml/2006/ole">
-            <mc:AlternateContent xmlns:mc="http://schemas.openxmlformats.org/markup-compatibility/2006">
-              <mc:Choice xmlns:v="urn:schemas-microsoft-com:vml" Requires="v">
-                <p:oleObj spid="_x0000_s2077" name="Equation" r:id="rId6" imgW="914400" imgH="198720" progId="Equation.3">
-                  <p:embed/>
-                </p:oleObj>
-              </mc:Choice>
-              <mc:Fallback>
-                <p:oleObj name="Equation" r:id="rId6" imgW="914400" imgH="198720" progId="Equation.3">
-                  <p:embed/>
-                  <p:pic>
-                    <p:nvPicPr>
-                      <p:cNvPr id="0" name=""/>
-                      <p:cNvPicPr>
-                        <a:picLocks noChangeAspect="1" noChangeArrowheads="1"/>
-                      </p:cNvPicPr>
-                      <p:nvPr/>
-                    </p:nvPicPr>
-                    <p:blipFill>
-                      <a:blip r:embed="rId5">
-                        <a:extLst>
-                          <a:ext uri="{28A0092B-C50C-407E-A947-70E740481C1C}">
-                            <a14:useLocalDpi xmlns:a14="http://schemas.microsoft.com/office/drawing/2010/main" val="0"/>
-                          </a:ext>
-                        </a:extLst>
-                      </a:blip>
-                      <a:srcRect/>
-                      <a:stretch>
-                        <a:fillRect/>
-                      </a:stretch>
-                    </p:blipFill>
-                    <p:spPr bwMode="auto">
-                      <a:xfrm>
-                        <a:off x="3594100" y="3225800"/>
-                        <a:ext cx="914400" cy="198438"/>
-                      </a:xfrm>
-                      <a:prstGeom prst="rect">
-                        <a:avLst/>
-                      </a:prstGeom>
-                      <a:noFill/>
-                      <a:extLst>
-                        <a:ext uri="{909E8E84-426E-40dd-AFC4-6F175D3DCCD1}">
-                          <a14:hiddenFill xmlns:a14="http://schemas.microsoft.com/office/drawing/2010/main">
-                            <a:solidFill>
-                              <a:srgbClr val="FFFFFF"/>
-                            </a:solidFill>
-                          </a14:hiddenFill>
-                        </a:ext>
-                      </a:extLst>
-                    </p:spPr>
-                  </p:pic>
-                </p:oleObj>
-              </mc:Fallback>
-            </mc:AlternateContent>
-          </a:graphicData>
-        </a:graphic>
-      </p:graphicFrame>
-      <p:sp>
-        <p:nvSpPr>
-          <p:cNvPr id="12" name="Slide Number Placeholder 11"/>
-          <p:cNvSpPr>
-            <a:spLocks noGrp="1" noChangeArrowheads="1"/>
-          </p:cNvSpPr>
-          <p:nvPr>
-            <p:ph type="sldNum" sz="quarter" idx="10"/>
-          </p:nvPr>
-        </p:nvSpPr>
-        <p:spPr/>
-        <p:txBody>
-          <a:bodyPr/>
-          <a:lstStyle>
-            <a:lvl1pPr>
-              <a:defRPr/>
-            </a:lvl1pPr>
-          </a:lstStyle>
-          <a:p>
-            <a:pPr>
-              <a:defRPr/>
-            </a:pPr>
-            <a:r>
-              <a:rPr lang="en-US" dirty="0" err="1" smtClean="0"/>
-              <a:t>lec</a:t>
-            </a:r>
-            <a:r>
-              <a:rPr lang="en-US" dirty="0" smtClean="0"/>
-              <a:t> 7F.</a:t>
-            </a:r>
-            <a:fld id="{BF4B27A8-4FA1-4DF7-89DB-09404700A23C}" type="slidenum">
-              <a:rPr lang="en-US" smtClean="0"/>
-              <a:pPr>
-                <a:defRPr/>
-              </a:pPr>
-              <a:t>15</a:t>
-            </a:fld>
-            <a:endParaRPr lang="en-US" dirty="0"/>
-          </a:p>
-        </p:txBody>
-      </p:sp>
-      <p:sp>
-        <p:nvSpPr>
-          <p:cNvPr id="13" name="Rectangle 12"/>
-          <p:cNvSpPr/>
-          <p:nvPr/>
-        </p:nvSpPr>
-        <p:spPr bwMode="auto">
-          <a:xfrm>
-            <a:off x="283779" y="835572"/>
-            <a:ext cx="8387255" cy="1686911"/>
-          </a:xfrm>
-          <a:prstGeom prst="rect">
-            <a:avLst/>
-          </a:prstGeom>
-          <a:noFill/>
-          <a:ln w="41275" cap="flat" cmpd="sng" algn="ctr">
-            <a:solidFill>
-              <a:srgbClr val="FF00FF"/>
-            </a:solidFill>
-            <a:prstDash val="sysDash"/>
-            <a:round/>
-            <a:headEnd type="none" w="med" len="med"/>
-            <a:tailEnd type="stealth" w="lg" len="lg"/>
-          </a:ln>
-          <a:effectLst/>
-        </p:spPr>
-        <p:txBody>
-          <a:bodyPr vert="horz" wrap="square" lIns="91440" tIns="45720" rIns="91440" bIns="45720" numCol="1" rtlCol="0" anchor="t" anchorCtr="0" compatLnSpc="1">
-            <a:prstTxWarp prst="textNoShape">
-              <a:avLst/>
-            </a:prstTxWarp>
-          </a:bodyPr>
-          <a:lstStyle/>
-          <a:p>
-            <a:pPr>
-              <a:spcBef>
-                <a:spcPct val="0"/>
-              </a:spcBef>
-              <a:buNone/>
-            </a:pPr>
-            <a:endParaRPr kumimoji="0" lang="en-US" sz="4000" b="0" i="0" u="none" strike="noStrike" cap="none" normalizeH="0" baseline="0" smtClean="0">
-              <a:ln>
-                <a:noFill/>
-              </a:ln>
-              <a:solidFill>
-                <a:schemeClr val="tx1"/>
-              </a:solidFill>
-              <a:effectLst/>
-              <a:latin typeface="Arial" pitchFamily="34" charset="0"/>
-            </a:endParaRPr>
-          </a:p>
-        </p:txBody>
-      </p:sp>
-      <p:sp>
-        <p:nvSpPr>
-          <p:cNvPr id="14" name="TextBox 13"/>
-          <p:cNvSpPr txBox="1"/>
-          <p:nvPr/>
-        </p:nvSpPr>
-        <p:spPr>
-          <a:xfrm>
-            <a:off x="699414" y="3720663"/>
-            <a:ext cx="7818592" cy="2123658"/>
-          </a:xfrm>
-          <a:prstGeom prst="rect">
-            <a:avLst/>
-          </a:prstGeom>
-          <a:noFill/>
-        </p:spPr>
-        <p:txBody>
-          <a:bodyPr wrap="none" rtlCol="0">
-            <a:spAutoFit/>
-          </a:bodyPr>
-          <a:lstStyle/>
-          <a:p>
-            <a:pPr>
-              <a:buNone/>
-            </a:pPr>
-            <a:r>
-              <a:rPr lang="en-US" sz="6000" dirty="0" smtClean="0">
-                <a:latin typeface="+mj-lt"/>
-              </a:rPr>
-              <a:t>a</a:t>
-            </a:r>
-            <a:r>
-              <a:rPr lang="en-US" sz="6000" dirty="0" smtClean="0">
-                <a:solidFill>
-                  <a:schemeClr val="accent1">
-                    <a:lumMod val="50000"/>
-                  </a:schemeClr>
-                </a:solidFill>
-                <a:latin typeface="+mj-lt"/>
-              </a:rPr>
-              <a:t> degree-constrained</a:t>
-            </a:r>
-          </a:p>
-          <a:p>
-            <a:pPr>
-              <a:buNone/>
-            </a:pPr>
-            <a:r>
-              <a:rPr lang="en-US" sz="6000" dirty="0" smtClean="0">
-                <a:latin typeface="+mj-lt"/>
-              </a:rPr>
-              <a:t>bipartite graph</a:t>
-            </a:r>
-          </a:p>
-        </p:txBody>
-      </p:sp>
-    </p:spTree>
-    <p:extLst>
-      <p:ext uri="{BB962C8B-B14F-4D97-AF65-F5344CB8AC3E}">
-        <p14:creationId xmlns:p14="http://schemas.microsoft.com/office/powerpoint/2010/main" val="3964111984"/>
-      </p:ext>
-    </p:extLst>
-  </p:cSld>
-  <p:clrMapOvr>
-    <a:masterClrMapping/>
-  </p:clrMapOvr>
-  <p:transition xmlns:p14="http://schemas.microsoft.com/office/powerpoint/2010/main">
-    <p:fade/>
-  </p:transition>
-  <p:timing>
-    <p:tnLst>
-      <p:par>
-        <p:cTn xmlns:p14="http://schemas.microsoft.com/office/powerpoint/2010/main" id="1" dur="indefinite" restart="never" nodeType="tmRoot">
-          <p:childTnLst>
-            <p:seq concurrent="1" nextAc="seek">
-              <p:cTn id="2" dur="indefinite" nodeType="mainSeq">
-                <p:childTnLst>
-                  <p:par>
-                    <p:cTn id="3" fill="hold">
-                      <p:stCondLst>
-                        <p:cond delay="indefinite"/>
-                      </p:stCondLst>
-                      <p:childTnLst>
-                        <p:par>
-                          <p:cTn id="4" fill="hold">
-                            <p:stCondLst>
-                              <p:cond delay="0"/>
-                            </p:stCondLst>
-                            <p:childTnLst>
-                              <p:par>
-                                <p:cTn id="5" presetID="15" presetClass="entr" presetSubtype="0" fill="hold" grpId="0" nodeType="clickEffect">
-                                  <p:stCondLst>
-                                    <p:cond delay="0"/>
-                                  </p:stCondLst>
-                                  <p:childTnLst>
-                                    <p:set>
-                                      <p:cBhvr>
-                                        <p:cTn id="6" dur="1" fill="hold">
-                                          <p:stCondLst>
-                                            <p:cond delay="0"/>
-                                          </p:stCondLst>
-                                        </p:cTn>
-                                        <p:tgtEl>
-                                          <p:spTgt spid="13"/>
-                                        </p:tgtEl>
-                                        <p:attrNameLst>
-                                          <p:attrName>style.visibility</p:attrName>
-                                        </p:attrNameLst>
-                                      </p:cBhvr>
-                                      <p:to>
-                                        <p:strVal val="visible"/>
-                                      </p:to>
-                                    </p:set>
-                                    <p:anim calcmode="lin" valueType="num">
-                                      <p:cBhvr>
-                                        <p:cTn id="7" dur="1000" fill="hold"/>
-                                        <p:tgtEl>
-                                          <p:spTgt spid="13"/>
-                                        </p:tgtEl>
-                                        <p:attrNameLst>
-                                          <p:attrName>ppt_w</p:attrName>
-                                        </p:attrNameLst>
-                                      </p:cBhvr>
-                                      <p:tavLst>
-                                        <p:tav tm="0">
-                                          <p:val>
-                                            <p:fltVal val="0"/>
-                                          </p:val>
-                                        </p:tav>
-                                        <p:tav tm="100000">
-                                          <p:val>
-                                            <p:strVal val="#ppt_w"/>
-                                          </p:val>
-                                        </p:tav>
-                                      </p:tavLst>
-                                    </p:anim>
-                                    <p:anim calcmode="lin" valueType="num">
-                                      <p:cBhvr>
-                                        <p:cTn id="8" dur="1000" fill="hold"/>
-                                        <p:tgtEl>
-                                          <p:spTgt spid="13"/>
-                                        </p:tgtEl>
-                                        <p:attrNameLst>
-                                          <p:attrName>ppt_h</p:attrName>
-                                        </p:attrNameLst>
-                                      </p:cBhvr>
-                                      <p:tavLst>
-                                        <p:tav tm="0">
-                                          <p:val>
-                                            <p:fltVal val="0"/>
-                                          </p:val>
-                                        </p:tav>
-                                        <p:tav tm="100000">
-                                          <p:val>
-                                            <p:strVal val="#ppt_h"/>
-                                          </p:val>
-                                        </p:tav>
-                                      </p:tavLst>
-                                    </p:anim>
-                                    <p:anim calcmode="lin" valueType="num">
-                                      <p:cBhvr>
-                                        <p:cTn id="9" dur="1000" fill="hold"/>
-                                        <p:tgtEl>
-                                          <p:spTgt spid="13"/>
-                                        </p:tgtEl>
-                                        <p:attrNameLst>
-                                          <p:attrName>ppt_x</p:attrName>
-                                        </p:attrNameLst>
-                                      </p:cBhvr>
-                                      <p:tavLst>
-                                        <p:tav tm="0" fmla="#ppt_x+(cos(-2*pi*(1-$))*-#ppt_x-sin(-2*pi*(1-$))*(1-#ppt_y))*(1-$)">
-                                          <p:val>
-                                            <p:fltVal val="0"/>
-                                          </p:val>
-                                        </p:tav>
-                                        <p:tav tm="100000">
-                                          <p:val>
-                                            <p:fltVal val="1"/>
-                                          </p:val>
-                                        </p:tav>
-                                      </p:tavLst>
-                                    </p:anim>
-                                    <p:anim calcmode="lin" valueType="num">
-                                      <p:cBhvr>
-                                        <p:cTn id="10" dur="1000" fill="hold"/>
-                                        <p:tgtEl>
-                                          <p:spTgt spid="13"/>
-                                        </p:tgtEl>
-                                        <p:attrNameLst>
-                                          <p:attrName>ppt_y</p:attrName>
-                                        </p:attrNameLst>
-                                      </p:cBhvr>
-                                      <p:tavLst>
-                                        <p:tav tm="0" fmla="#ppt_y+(sin(-2*pi*(1-$))*-#ppt_x+cos(-2*pi*(1-$))*(1-#ppt_y))*(1-$)">
-                                          <p:val>
-                                            <p:fltVal val="0"/>
-                                          </p:val>
-                                        </p:tav>
-                                        <p:tav tm="100000">
-                                          <p:val>
-                                            <p:fltVal val="1"/>
-                                          </p:val>
-                                        </p:tav>
-                                      </p:tavLst>
-                                    </p:anim>
-                                  </p:childTnLst>
-                                </p:cTn>
-                              </p:par>
-                            </p:childTnLst>
-                          </p:cTn>
-                        </p:par>
-                      </p:childTnLst>
-                    </p:cTn>
-                  </p:par>
-                  <p:par>
-                    <p:cTn id="11" fill="hold">
-                      <p:stCondLst>
-                        <p:cond delay="indefinite"/>
-                      </p:stCondLst>
-                      <p:childTnLst>
-                        <p:par>
-                          <p:cTn id="12" fill="hold">
-                            <p:stCondLst>
-                              <p:cond delay="0"/>
-                            </p:stCondLst>
-                            <p:childTnLst>
-                              <p:par>
-                                <p:cTn id="13" presetID="10" presetClass="entr" presetSubtype="0" fill="hold" grpId="0" nodeType="clickEffect">
-                                  <p:stCondLst>
-                                    <p:cond delay="0"/>
-                                  </p:stCondLst>
-                                  <p:childTnLst>
-                                    <p:set>
-                                      <p:cBhvr>
-                                        <p:cTn id="14" dur="1" fill="hold">
-                                          <p:stCondLst>
-                                            <p:cond delay="0"/>
-                                          </p:stCondLst>
-                                        </p:cTn>
-                                        <p:tgtEl>
-                                          <p:spTgt spid="14"/>
-                                        </p:tgtEl>
-                                        <p:attrNameLst>
-                                          <p:attrName>style.visibility</p:attrName>
-                                        </p:attrNameLst>
-                                      </p:cBhvr>
-                                      <p:to>
-                                        <p:strVal val="visible"/>
-                                      </p:to>
-                                    </p:set>
-                                    <p:animEffect transition="in" filter="fade">
-                                      <p:cBhvr>
-                                        <p:cTn id="15" dur="500"/>
-                                        <p:tgtEl>
-                                          <p:spTgt spid="14"/>
-                                        </p:tgtEl>
-                                      </p:cBhvr>
-                                    </p:animEffect>
-                                  </p:childTnLst>
-                                </p:cTn>
-                              </p:par>
-                            </p:childTnLst>
-                          </p:cTn>
-                        </p:par>
-                      </p:childTnLst>
-                    </p:cTn>
-                  </p:par>
-                </p:childTnLst>
-              </p:cTn>
-              <p:prevCondLst>
-                <p:cond evt="onPrev" delay="0">
-                  <p:tgtEl>
-                    <p:sldTgt/>
-                  </p:tgtEl>
-                </p:cond>
-              </p:prevCondLst>
-              <p:nextCondLst>
-                <p:cond evt="onNext" delay="0">
-                  <p:tgtEl>
-                    <p:sldTgt/>
-                  </p:tgtEl>
-                </p:cond>
-              </p:nextCondLst>
-            </p:seq>
-          </p:childTnLst>
-        </p:cTn>
-      </p:par>
-    </p:tnLst>
-    <p:bldLst>
-      <p:bldP spid="13" grpId="0" animBg="1"/>
-      <p:bldP spid="14" grpId="0"/>
-    </p:bldLst>
   </p:timing>
 </p:sld>
 </file>
@@ -9035,8 +7034,8 @@
   <p:clrMapOvr>
     <a:masterClrMapping/>
   </p:clrMapOvr>
-  <p:transition xmlns:p14="http://schemas.microsoft.com/office/powerpoint/2010/main">
-    <p:fade/>
+  <p:transition xmlns:p14="http://schemas.microsoft.com/office/powerpoint/2010/main" spd="slow">
+    <p:fade thruBlk="1"/>
   </p:transition>
   <p:timing>
     <p:tnLst>
@@ -16697,7 +14696,7 @@
         <p:spPr bwMode="auto">
           <a:xfrm>
             <a:off x="7641957" y="3304223"/>
-            <a:ext cx="1439818" cy="769441"/>
+            <a:ext cx="1341558" cy="769441"/>
           </a:xfrm>
           <a:prstGeom prst="rect">
             <a:avLst/>
@@ -16722,7 +14721,7 @@
               <a:rPr lang="en-US" sz="4400" dirty="0" smtClean="0">
                 <a:latin typeface="Comic Sans MS" pitchFamily="8" charset="0"/>
               </a:rPr>
-              <a:t>N(</a:t>
+              <a:t>E(</a:t>
             </a:r>
             <a:r>
               <a:rPr lang="en-US" sz="4400" dirty="0" smtClean="0">
@@ -16844,6 +14843,9 @@
             </a:pPr>
             <a:r>
               <a:rPr lang="en-US" sz="5400" b="1" dirty="0" smtClean="0">
+                <a:solidFill>
+                  <a:srgbClr val="FF0000"/>
+                </a:solidFill>
                 <a:latin typeface="Times New Roman" pitchFamily="18" charset="0"/>
                 <a:cs typeface="Times New Roman" pitchFamily="18" charset="0"/>
               </a:rPr>
@@ -16853,7 +14855,7 @@
               <a:rPr lang="en-US" sz="5400" dirty="0" smtClean="0">
                 <a:latin typeface="Comic Sans MS" pitchFamily="8" charset="0"/>
               </a:rPr>
-              <a:t>  2 = |N(</a:t>
+              <a:t> 2 = |E(</a:t>
             </a:r>
             <a:r>
               <a:rPr lang="en-US" sz="5400" dirty="0" smtClean="0">

</xml_diff>